<commit_message>
Update files and remove obsolete ones
</commit_message>
<xml_diff>
--- a/notebooks-PJ/coupling.pptx
+++ b/notebooks-PJ/coupling.pptx
@@ -6,10 +6,16 @@
   </p:sldMasterIdLst>
   <p:sldIdLst>
     <p:sldId id="257" r:id="rId2"/>
-    <p:sldId id="258" r:id="rId3"/>
-    <p:sldId id="260" r:id="rId4"/>
+    <p:sldId id="265" r:id="rId3"/>
+    <p:sldId id="262" r:id="rId4"/>
     <p:sldId id="261" r:id="rId5"/>
-    <p:sldId id="259" r:id="rId6"/>
+    <p:sldId id="258" r:id="rId6"/>
+    <p:sldId id="260" r:id="rId7"/>
+    <p:sldId id="263" r:id="rId8"/>
+    <p:sldId id="259" r:id="rId9"/>
+    <p:sldId id="266" r:id="rId10"/>
+    <p:sldId id="264" r:id="rId11"/>
+    <p:sldId id="267" r:id="rId12"/>
   </p:sldIdLst>
   <p:sldSz cx="12192000" cy="6858000"/>
   <p:notesSz cx="6858000" cy="9144000"/>
@@ -263,7 +269,7 @@
           <a:p>
             <a:fld id="{CD464D0A-16E6-4E65-92DC-9C23A5755BF0}" type="datetimeFigureOut">
               <a:rPr lang="en-US" smtClean="0"/>
-              <a:t>9/25/2025</a:t>
+              <a:t>11/14/2025</a:t>
             </a:fld>
             <a:endParaRPr lang="en-US"/>
           </a:p>
@@ -461,7 +467,7 @@
           <a:p>
             <a:fld id="{CD464D0A-16E6-4E65-92DC-9C23A5755BF0}" type="datetimeFigureOut">
               <a:rPr lang="en-US" smtClean="0"/>
-              <a:t>9/25/2025</a:t>
+              <a:t>11/14/2025</a:t>
             </a:fld>
             <a:endParaRPr lang="en-US"/>
           </a:p>
@@ -669,7 +675,7 @@
           <a:p>
             <a:fld id="{CD464D0A-16E6-4E65-92DC-9C23A5755BF0}" type="datetimeFigureOut">
               <a:rPr lang="en-US" smtClean="0"/>
-              <a:t>9/25/2025</a:t>
+              <a:t>11/14/2025</a:t>
             </a:fld>
             <a:endParaRPr lang="en-US"/>
           </a:p>
@@ -867,7 +873,7 @@
           <a:p>
             <a:fld id="{CD464D0A-16E6-4E65-92DC-9C23A5755BF0}" type="datetimeFigureOut">
               <a:rPr lang="en-US" smtClean="0"/>
-              <a:t>9/25/2025</a:t>
+              <a:t>11/14/2025</a:t>
             </a:fld>
             <a:endParaRPr lang="en-US"/>
           </a:p>
@@ -1142,7 +1148,7 @@
           <a:p>
             <a:fld id="{CD464D0A-16E6-4E65-92DC-9C23A5755BF0}" type="datetimeFigureOut">
               <a:rPr lang="en-US" smtClean="0"/>
-              <a:t>9/25/2025</a:t>
+              <a:t>11/14/2025</a:t>
             </a:fld>
             <a:endParaRPr lang="en-US"/>
           </a:p>
@@ -1407,7 +1413,7 @@
           <a:p>
             <a:fld id="{CD464D0A-16E6-4E65-92DC-9C23A5755BF0}" type="datetimeFigureOut">
               <a:rPr lang="en-US" smtClean="0"/>
-              <a:t>9/25/2025</a:t>
+              <a:t>11/14/2025</a:t>
             </a:fld>
             <a:endParaRPr lang="en-US"/>
           </a:p>
@@ -1819,7 +1825,7 @@
           <a:p>
             <a:fld id="{CD464D0A-16E6-4E65-92DC-9C23A5755BF0}" type="datetimeFigureOut">
               <a:rPr lang="en-US" smtClean="0"/>
-              <a:t>9/25/2025</a:t>
+              <a:t>11/14/2025</a:t>
             </a:fld>
             <a:endParaRPr lang="en-US"/>
           </a:p>
@@ -1960,7 +1966,7 @@
           <a:p>
             <a:fld id="{CD464D0A-16E6-4E65-92DC-9C23A5755BF0}" type="datetimeFigureOut">
               <a:rPr lang="en-US" smtClean="0"/>
-              <a:t>9/25/2025</a:t>
+              <a:t>11/14/2025</a:t>
             </a:fld>
             <a:endParaRPr lang="en-US"/>
           </a:p>
@@ -2073,7 +2079,7 @@
           <a:p>
             <a:fld id="{CD464D0A-16E6-4E65-92DC-9C23A5755BF0}" type="datetimeFigureOut">
               <a:rPr lang="en-US" smtClean="0"/>
-              <a:t>9/25/2025</a:t>
+              <a:t>11/14/2025</a:t>
             </a:fld>
             <a:endParaRPr lang="en-US"/>
           </a:p>
@@ -2384,7 +2390,7 @@
           <a:p>
             <a:fld id="{CD464D0A-16E6-4E65-92DC-9C23A5755BF0}" type="datetimeFigureOut">
               <a:rPr lang="en-US" smtClean="0"/>
-              <a:t>9/25/2025</a:t>
+              <a:t>11/14/2025</a:t>
             </a:fld>
             <a:endParaRPr lang="en-US"/>
           </a:p>
@@ -2672,7 +2678,7 @@
           <a:p>
             <a:fld id="{CD464D0A-16E6-4E65-92DC-9C23A5755BF0}" type="datetimeFigureOut">
               <a:rPr lang="en-US" smtClean="0"/>
-              <a:t>9/25/2025</a:t>
+              <a:t>11/14/2025</a:t>
             </a:fld>
             <a:endParaRPr lang="en-US"/>
           </a:p>
@@ -2913,7 +2919,7 @@
           <a:p>
             <a:fld id="{CD464D0A-16E6-4E65-92DC-9C23A5755BF0}" type="datetimeFigureOut">
               <a:rPr lang="en-US" smtClean="0"/>
-              <a:t>9/25/2025</a:t>
+              <a:t>11/14/2025</a:t>
             </a:fld>
             <a:endParaRPr lang="en-US"/>
           </a:p>
@@ -3851,6 +3857,317 @@
 </p:sld>
 </file>
 
+<file path=ppt/slides/slide10.xml><?xml version="1.0" encoding="utf-8"?>
+<p:sld xmlns:a="http://schemas.openxmlformats.org/drawingml/2006/main" xmlns:r="http://schemas.openxmlformats.org/officeDocument/2006/relationships" xmlns:p="http://schemas.openxmlformats.org/presentationml/2006/main">
+  <p:cSld>
+    <p:spTree>
+      <p:nvGrpSpPr>
+        <p:cNvPr id="1" name=""/>
+        <p:cNvGrpSpPr/>
+        <p:nvPr/>
+      </p:nvGrpSpPr>
+      <p:grpSpPr>
+        <a:xfrm>
+          <a:off x="0" y="0"/>
+          <a:ext cx="0" cy="0"/>
+          <a:chOff x="0" y="0"/>
+          <a:chExt cx="0" cy="0"/>
+        </a:xfrm>
+      </p:grpSpPr>
+      <p:sp>
+        <p:nvSpPr>
+          <p:cNvPr id="2" name="Title 1">
+            <a:extLst>
+              <a:ext uri="{FF2B5EF4-FFF2-40B4-BE49-F238E27FC236}">
+                <a16:creationId xmlns:a16="http://schemas.microsoft.com/office/drawing/2014/main" id="{6B4369C7-5AD5-78E5-3DDA-E365A5DE051A}"/>
+              </a:ext>
+            </a:extLst>
+          </p:cNvPr>
+          <p:cNvSpPr>
+            <a:spLocks noGrp="1"/>
+          </p:cNvSpPr>
+          <p:nvPr>
+            <p:ph type="title"/>
+          </p:nvPr>
+        </p:nvSpPr>
+        <p:spPr/>
+        <p:txBody>
+          <a:bodyPr/>
+          <a:lstStyle/>
+          <a:p>
+            <a:r>
+              <a:rPr lang="en-US" dirty="0"/>
+              <a:t>Coupling with 1-minute SWMM</a:t>
+            </a:r>
+          </a:p>
+        </p:txBody>
+      </p:sp>
+      <p:sp>
+        <p:nvSpPr>
+          <p:cNvPr id="4" name="TextBox 3">
+            <a:extLst>
+              <a:ext uri="{FF2B5EF4-FFF2-40B4-BE49-F238E27FC236}">
+                <a16:creationId xmlns:a16="http://schemas.microsoft.com/office/drawing/2014/main" id="{262E535C-8E84-A730-AFFB-51CE44A6E87C}"/>
+              </a:ext>
+            </a:extLst>
+          </p:cNvPr>
+          <p:cNvSpPr txBox="1"/>
+          <p:nvPr/>
+        </p:nvSpPr>
+        <p:spPr>
+          <a:xfrm>
+            <a:off x="1466849" y="2085975"/>
+            <a:ext cx="8201025" cy="2585323"/>
+          </a:xfrm>
+          <a:prstGeom prst="rect">
+            <a:avLst/>
+          </a:prstGeom>
+          <a:noFill/>
+        </p:spPr>
+        <p:txBody>
+          <a:bodyPr wrap="square" rtlCol="0">
+            <a:spAutoFit/>
+          </a:bodyPr>
+          <a:lstStyle/>
+          <a:p>
+            <a:pPr marL="285750" indent="-285750">
+              <a:buFont typeface="Arial" panose="020B0604020202020204" pitchFamily="34" charset="0"/>
+              <a:buChar char="•"/>
+            </a:pPr>
+            <a:r>
+              <a:rPr lang="en-US" dirty="0"/>
+              <a:t>VP &amp; company share 2 SWMM simulations with 1-min timesteps</a:t>
+            </a:r>
+          </a:p>
+          <a:p>
+            <a:pPr marL="742950" lvl="1" indent="-285750">
+              <a:buFont typeface="Arial" panose="020B0604020202020204" pitchFamily="34" charset="0"/>
+              <a:buChar char="•"/>
+            </a:pPr>
+            <a:r>
+              <a:rPr lang="en-US" dirty="0"/>
+              <a:t>A. Simulates all of 2018 (begins 1/1/2018)</a:t>
+            </a:r>
+          </a:p>
+          <a:p>
+            <a:pPr marL="742950" lvl="1" indent="-285750">
+              <a:buFont typeface="Arial" panose="020B0604020202020204" pitchFamily="34" charset="0"/>
+              <a:buChar char="•"/>
+            </a:pPr>
+            <a:endParaRPr lang="en-US" dirty="0"/>
+          </a:p>
+          <a:p>
+            <a:pPr marL="742950" lvl="1" indent="-285750">
+              <a:buFont typeface="Arial" panose="020B0604020202020204" pitchFamily="34" charset="0"/>
+              <a:buChar char="•"/>
+            </a:pPr>
+            <a:endParaRPr lang="en-US" dirty="0"/>
+          </a:p>
+          <a:p>
+            <a:pPr marL="742950" lvl="1" indent="-285750">
+              <a:buFont typeface="Arial" panose="020B0604020202020204" pitchFamily="34" charset="0"/>
+              <a:buChar char="•"/>
+            </a:pPr>
+            <a:endParaRPr lang="en-US" dirty="0"/>
+          </a:p>
+          <a:p>
+            <a:pPr marL="742950" lvl="1" indent="-285750">
+              <a:buFont typeface="Arial" panose="020B0604020202020204" pitchFamily="34" charset="0"/>
+              <a:buChar char="•"/>
+            </a:pPr>
+            <a:r>
+              <a:rPr lang="en-US" dirty="0"/>
+              <a:t>B. </a:t>
+            </a:r>
+            <a:r>
+              <a:rPr lang="en-US" dirty="0">
+                <a:highlight>
+                  <a:srgbClr val="FFFF00"/>
+                </a:highlight>
+              </a:rPr>
+              <a:t>Simulates Sept-Oct 2018 (2018-09-20 23:49:00) </a:t>
+            </a:r>
+          </a:p>
+          <a:p>
+            <a:pPr marL="1200150" lvl="2" indent="-285750">
+              <a:buFont typeface="Arial" panose="020B0604020202020204" pitchFamily="34" charset="0"/>
+              <a:buChar char="•"/>
+            </a:pPr>
+            <a:r>
+              <a:rPr lang="en-US" dirty="0">
+                <a:highlight>
+                  <a:srgbClr val="FFFF00"/>
+                </a:highlight>
+              </a:rPr>
+              <a:t>This goes against the current assumption that MF &gt; SWMM&gt; </a:t>
+            </a:r>
+            <a:r>
+              <a:rPr lang="en-US" dirty="0" err="1">
+                <a:highlight>
+                  <a:srgbClr val="FFFF00"/>
+                </a:highlight>
+              </a:rPr>
+              <a:t>Dflow</a:t>
+            </a:r>
+            <a:endParaRPr lang="en-US" dirty="0">
+              <a:highlight>
+                <a:srgbClr val="FFFF00"/>
+              </a:highlight>
+            </a:endParaRPr>
+          </a:p>
+          <a:p>
+            <a:pPr marL="1200150" lvl="2" indent="-285750">
+              <a:buFont typeface="Arial" panose="020B0604020202020204" pitchFamily="34" charset="0"/>
+              <a:buChar char="•"/>
+            </a:pPr>
+            <a:r>
+              <a:rPr lang="en-US" dirty="0">
+                <a:highlight>
+                  <a:srgbClr val="FFFF00"/>
+                </a:highlight>
+              </a:rPr>
+              <a:t>I wrote a bunch of logical statements to allow flexibility for which SWMM simulation is used .But I cannot get them perfectly coupled. </a:t>
+            </a:r>
+          </a:p>
+        </p:txBody>
+      </p:sp>
+      <p:pic>
+        <p:nvPicPr>
+          <p:cNvPr id="6" name="Picture 5">
+            <a:extLst>
+              <a:ext uri="{FF2B5EF4-FFF2-40B4-BE49-F238E27FC236}">
+                <a16:creationId xmlns:a16="http://schemas.microsoft.com/office/drawing/2014/main" id="{146E9F02-F7E5-4B11-EE65-76F526FFD385}"/>
+              </a:ext>
+            </a:extLst>
+          </p:cNvPr>
+          <p:cNvPicPr>
+            <a:picLocks noChangeAspect="1"/>
+          </p:cNvPicPr>
+          <p:nvPr/>
+        </p:nvPicPr>
+        <p:blipFill>
+          <a:blip r:embed="rId2"/>
+          <a:stretch>
+            <a:fillRect/>
+          </a:stretch>
+        </p:blipFill>
+        <p:spPr>
+          <a:xfrm>
+            <a:off x="1539591" y="4892653"/>
+            <a:ext cx="8238172" cy="1600222"/>
+          </a:xfrm>
+          <a:prstGeom prst="rect">
+            <a:avLst/>
+          </a:prstGeom>
+        </p:spPr>
+      </p:pic>
+    </p:spTree>
+    <p:extLst>
+      <p:ext uri="{BB962C8B-B14F-4D97-AF65-F5344CB8AC3E}">
+        <p14:creationId xmlns:p14="http://schemas.microsoft.com/office/powerpoint/2010/main" val="60022393"/>
+      </p:ext>
+    </p:extLst>
+  </p:cSld>
+  <p:clrMapOvr>
+    <a:masterClrMapping/>
+  </p:clrMapOvr>
+</p:sld>
+</file>
+
+<file path=ppt/slides/slide11.xml><?xml version="1.0" encoding="utf-8"?>
+<p:sld xmlns:a="http://schemas.openxmlformats.org/drawingml/2006/main" xmlns:r="http://schemas.openxmlformats.org/officeDocument/2006/relationships" xmlns:p="http://schemas.openxmlformats.org/presentationml/2006/main">
+  <p:cSld>
+    <p:spTree>
+      <p:nvGrpSpPr>
+        <p:cNvPr id="1" name=""/>
+        <p:cNvGrpSpPr/>
+        <p:nvPr/>
+      </p:nvGrpSpPr>
+      <p:grpSpPr>
+        <a:xfrm>
+          <a:off x="0" y="0"/>
+          <a:ext cx="0" cy="0"/>
+          <a:chOff x="0" y="0"/>
+          <a:chExt cx="0" cy="0"/>
+        </a:xfrm>
+      </p:grpSpPr>
+      <p:sp>
+        <p:nvSpPr>
+          <p:cNvPr id="2" name="Title 1">
+            <a:extLst>
+              <a:ext uri="{FF2B5EF4-FFF2-40B4-BE49-F238E27FC236}">
+                <a16:creationId xmlns:a16="http://schemas.microsoft.com/office/drawing/2014/main" id="{CF5E9F3F-6D1E-B8D7-74C5-1DA55E1E1809}"/>
+              </a:ext>
+            </a:extLst>
+          </p:cNvPr>
+          <p:cNvSpPr>
+            <a:spLocks noGrp="1"/>
+          </p:cNvSpPr>
+          <p:nvPr>
+            <p:ph type="title"/>
+          </p:nvPr>
+        </p:nvSpPr>
+        <p:spPr/>
+        <p:txBody>
+          <a:bodyPr/>
+          <a:lstStyle/>
+          <a:p>
+            <a:r>
+              <a:rPr lang="en-US" dirty="0"/>
+              <a:t>11/14/2025 Notes after this slide</a:t>
+            </a:r>
+          </a:p>
+        </p:txBody>
+      </p:sp>
+      <p:sp>
+        <p:nvSpPr>
+          <p:cNvPr id="3" name="Content Placeholder 2">
+            <a:extLst>
+              <a:ext uri="{FF2B5EF4-FFF2-40B4-BE49-F238E27FC236}">
+                <a16:creationId xmlns:a16="http://schemas.microsoft.com/office/drawing/2014/main" id="{08707188-3B27-33E3-A751-4E35A76A1287}"/>
+              </a:ext>
+            </a:extLst>
+          </p:cNvPr>
+          <p:cNvSpPr>
+            <a:spLocks noGrp="1"/>
+          </p:cNvSpPr>
+          <p:nvPr>
+            <p:ph idx="1"/>
+          </p:nvPr>
+        </p:nvSpPr>
+        <p:spPr/>
+        <p:txBody>
+          <a:bodyPr/>
+          <a:lstStyle/>
+          <a:p>
+            <a:r>
+              <a:rPr lang="en-US" dirty="0"/>
+              <a:t>Mill creek drains are also wells for </a:t>
+            </a:r>
+            <a:r>
+              <a:rPr lang="en-US" dirty="0" err="1"/>
+              <a:t>swmm</a:t>
+            </a:r>
+            <a:r>
+              <a:rPr lang="en-US" dirty="0"/>
+              <a:t>. What issues can this pose?</a:t>
+            </a:r>
+          </a:p>
+        </p:txBody>
+      </p:sp>
+    </p:spTree>
+    <p:extLst>
+      <p:ext uri="{BB962C8B-B14F-4D97-AF65-F5344CB8AC3E}">
+        <p14:creationId xmlns:p14="http://schemas.microsoft.com/office/powerpoint/2010/main" val="3971952136"/>
+      </p:ext>
+    </p:extLst>
+  </p:cSld>
+  <p:clrMapOvr>
+    <a:masterClrMapping/>
+  </p:clrMapOvr>
+</p:sld>
+</file>
+
 <file path=ppt/slides/slide2.xml><?xml version="1.0" encoding="utf-8"?>
 <p:sld xmlns:a="http://schemas.openxmlformats.org/drawingml/2006/main" xmlns:r="http://schemas.openxmlformats.org/officeDocument/2006/relationships" xmlns:p="http://schemas.openxmlformats.org/presentationml/2006/main">
   <p:cSld>
@@ -3870,24 +4187,24 @@
       </p:grpSpPr>
       <p:sp>
         <p:nvSpPr>
-          <p:cNvPr id="2" name="Title 1">
-            <a:extLst>
-              <a:ext uri="{FF2B5EF4-FFF2-40B4-BE49-F238E27FC236}">
-                <a16:creationId xmlns:a16="http://schemas.microsoft.com/office/drawing/2014/main" id="{0E8773D0-442D-CEDB-F66E-D1B2BDFA9001}"/>
-              </a:ext>
-            </a:extLst>
-          </p:cNvPr>
-          <p:cNvSpPr>
-            <a:spLocks noGrp="1"/>
-          </p:cNvSpPr>
-          <p:nvPr>
-            <p:ph type="title"/>
-          </p:nvPr>
-        </p:nvSpPr>
-        <p:spPr>
-          <a:xfrm>
-            <a:off x="838200" y="365125"/>
-            <a:ext cx="2781300" cy="1325563"/>
+          <p:cNvPr id="3" name="Content Placeholder 2">
+            <a:extLst>
+              <a:ext uri="{FF2B5EF4-FFF2-40B4-BE49-F238E27FC236}">
+                <a16:creationId xmlns:a16="http://schemas.microsoft.com/office/drawing/2014/main" id="{46B13B58-F1C9-B2CF-6903-C7C34A355526}"/>
+              </a:ext>
+            </a:extLst>
+          </p:cNvPr>
+          <p:cNvSpPr>
+            <a:spLocks noGrp="1"/>
+          </p:cNvSpPr>
+          <p:nvPr>
+            <p:ph idx="1"/>
+          </p:nvPr>
+        </p:nvSpPr>
+        <p:spPr>
+          <a:xfrm>
+            <a:off x="561975" y="701675"/>
+            <a:ext cx="10515600" cy="1163701"/>
           </a:xfrm>
         </p:spPr>
         <p:txBody>
@@ -3896,157 +4213,21 @@
           <a:p>
             <a:r>
               <a:rPr lang="en-US" dirty="0"/>
-              <a:t>MF + </a:t>
-            </a:r>
-            <a:r>
-              <a:rPr lang="en-US" dirty="0" err="1"/>
-              <a:t>Dflow</a:t>
-            </a:r>
+              <a:t>Review preliminary results</a:t>
+            </a:r>
+          </a:p>
+          <a:p>
             <a:r>
               <a:rPr lang="en-US" dirty="0"/>
-              <a:t>        </a:t>
-            </a:r>
-          </a:p>
-        </p:txBody>
-      </p:sp>
-      <p:sp>
-        <p:nvSpPr>
-          <p:cNvPr id="3" name="Content Placeholder 2">
-            <a:extLst>
-              <a:ext uri="{FF2B5EF4-FFF2-40B4-BE49-F238E27FC236}">
-                <a16:creationId xmlns:a16="http://schemas.microsoft.com/office/drawing/2014/main" id="{02DE311B-AB94-F6EA-EDE8-1934381D4679}"/>
-              </a:ext>
-            </a:extLst>
-          </p:cNvPr>
-          <p:cNvSpPr>
-            <a:spLocks noGrp="1"/>
-          </p:cNvSpPr>
-          <p:nvPr>
-            <p:ph idx="1"/>
-          </p:nvPr>
-        </p:nvSpPr>
-        <p:spPr/>
-        <p:txBody>
-          <a:bodyPr/>
-          <a:lstStyle/>
-          <a:p>
-            <a:r>
-              <a:rPr lang="en-US" strike="sngStrike" dirty="0"/>
-              <a:t>Head time series at locations with </a:t>
-            </a:r>
-            <a:r>
-              <a:rPr lang="en-US" strike="sngStrike" dirty="0" err="1"/>
-              <a:t>swmm</a:t>
-            </a:r>
-            <a:r>
-              <a:rPr lang="en-US" strike="sngStrike" dirty="0"/>
-              <a:t> nodes. </a:t>
-            </a:r>
-          </a:p>
-        </p:txBody>
-      </p:sp>
-      <p:sp>
-        <p:nvSpPr>
-          <p:cNvPr id="4" name="Title 1">
-            <a:extLst>
-              <a:ext uri="{FF2B5EF4-FFF2-40B4-BE49-F238E27FC236}">
-                <a16:creationId xmlns:a16="http://schemas.microsoft.com/office/drawing/2014/main" id="{E56744F6-8480-2FF3-8CD8-E4F0DBE0D545}"/>
-              </a:ext>
-            </a:extLst>
-          </p:cNvPr>
-          <p:cNvSpPr txBox="1">
-            <a:spLocks/>
-          </p:cNvSpPr>
-          <p:nvPr/>
-        </p:nvSpPr>
-        <p:spPr>
-          <a:xfrm>
-            <a:off x="6867525" y="365124"/>
-            <a:ext cx="4972050" cy="1325563"/>
-          </a:xfrm>
-          <a:prstGeom prst="rect">
-            <a:avLst/>
-          </a:prstGeom>
-        </p:spPr>
-        <p:txBody>
-          <a:bodyPr vert="horz" lIns="91440" tIns="45720" rIns="91440" bIns="45720" rtlCol="0" anchor="ctr">
-            <a:normAutofit/>
-          </a:bodyPr>
-          <a:lstStyle>
-            <a:lvl1pPr algn="l" defTabSz="914400" rtl="0" eaLnBrk="1" latinLnBrk="0" hangingPunct="1">
-              <a:lnSpc>
-                <a:spcPct val="90000"/>
-              </a:lnSpc>
-              <a:spcBef>
-                <a:spcPct val="0"/>
-              </a:spcBef>
-              <a:buNone/>
-              <a:defRPr sz="4400" kern="1200">
-                <a:solidFill>
-                  <a:schemeClr val="tx1"/>
-                </a:solidFill>
-                <a:latin typeface="+mj-lt"/>
-                <a:ea typeface="+mj-ea"/>
-                <a:cs typeface="+mj-cs"/>
-              </a:defRPr>
-            </a:lvl1pPr>
-          </a:lstStyle>
-          <a:p>
-            <a:r>
-              <a:rPr lang="en-US" dirty="0"/>
-              <a:t>MF + </a:t>
-            </a:r>
-            <a:r>
-              <a:rPr lang="en-US" dirty="0" err="1"/>
-              <a:t>Dflow</a:t>
-            </a:r>
-            <a:r>
-              <a:rPr lang="en-US" dirty="0"/>
-              <a:t>+ SWMM        </a:t>
-            </a:r>
-          </a:p>
-        </p:txBody>
-      </p:sp>
-      <p:pic>
-        <p:nvPicPr>
-          <p:cNvPr id="6" name="Picture 5">
-            <a:extLst>
-              <a:ext uri="{FF2B5EF4-FFF2-40B4-BE49-F238E27FC236}">
-                <a16:creationId xmlns:a16="http://schemas.microsoft.com/office/drawing/2014/main" id="{88B65CCB-DEDA-9136-8EC9-3A690889DD8D}"/>
-              </a:ext>
-            </a:extLst>
-          </p:cNvPr>
-          <p:cNvPicPr>
-            <a:picLocks noChangeAspect="1"/>
-          </p:cNvPicPr>
-          <p:nvPr/>
-        </p:nvPicPr>
-        <p:blipFill>
-          <a:blip r:embed="rId2">
-            <a:extLst>
-              <a:ext uri="{28A0092B-C50C-407E-A947-70E740481C1C}">
-                <a14:useLocalDpi xmlns:a14="http://schemas.microsoft.com/office/drawing/2010/main" val="0"/>
-              </a:ext>
-            </a:extLst>
-          </a:blip>
-          <a:stretch>
-            <a:fillRect/>
-          </a:stretch>
-        </p:blipFill>
-        <p:spPr>
-          <a:xfrm>
-            <a:off x="1343787" y="1557970"/>
-            <a:ext cx="7252232" cy="4351339"/>
-          </a:xfrm>
-          <a:prstGeom prst="rect">
-            <a:avLst/>
-          </a:prstGeom>
-        </p:spPr>
-      </p:pic>
+              <a:t>Second eyes on 3-way couple timing</a:t>
+            </a:r>
+          </a:p>
+        </p:txBody>
+      </p:sp>
     </p:spTree>
     <p:extLst>
       <p:ext uri="{BB962C8B-B14F-4D97-AF65-F5344CB8AC3E}">
-        <p14:creationId xmlns:p14="http://schemas.microsoft.com/office/powerpoint/2010/main" val="3377756592"/>
+        <p14:creationId xmlns:p14="http://schemas.microsoft.com/office/powerpoint/2010/main" val="604004529"/>
       </p:ext>
     </p:extLst>
   </p:cSld>
@@ -4073,70 +4254,12 @@
           <a:chExt cx="0" cy="0"/>
         </a:xfrm>
       </p:grpSpPr>
-      <p:sp>
-        <p:nvSpPr>
-          <p:cNvPr id="2" name="Title 1">
-            <a:extLst>
-              <a:ext uri="{FF2B5EF4-FFF2-40B4-BE49-F238E27FC236}">
-                <a16:creationId xmlns:a16="http://schemas.microsoft.com/office/drawing/2014/main" id="{8C2007AA-546B-95E0-67C0-03F97BFD6032}"/>
-              </a:ext>
-            </a:extLst>
-          </p:cNvPr>
-          <p:cNvSpPr>
-            <a:spLocks noGrp="1"/>
-          </p:cNvSpPr>
-          <p:nvPr>
-            <p:ph type="title"/>
-          </p:nvPr>
-        </p:nvSpPr>
-        <p:spPr>
-          <a:xfrm>
-            <a:off x="838200" y="365126"/>
-            <a:ext cx="10515600" cy="711200"/>
-          </a:xfrm>
-        </p:spPr>
-        <p:txBody>
-          <a:bodyPr>
-            <a:normAutofit fontScale="90000"/>
-          </a:bodyPr>
-          <a:lstStyle/>
-          <a:p>
-            <a:r>
-              <a:rPr lang="en-US" dirty="0"/>
-              <a:t>MF + </a:t>
-            </a:r>
-            <a:r>
-              <a:rPr lang="en-US" dirty="0" err="1"/>
-              <a:t>Dflow</a:t>
-            </a:r>
-            <a:r>
-              <a:rPr lang="en-US" dirty="0"/>
-              <a:t>+ SWMM</a:t>
-            </a:r>
-            <a:br>
-              <a:rPr lang="en-US" dirty="0"/>
-            </a:br>
-            <a:r>
-              <a:rPr lang="en-US" dirty="0" err="1"/>
-              <a:t>SWMM</a:t>
-            </a:r>
-            <a:r>
-              <a:rPr lang="en-US" dirty="0"/>
-              <a:t> Well Flux        </a:t>
-            </a:r>
-            <a:br>
-              <a:rPr lang="en-US" dirty="0"/>
-            </a:br>
-            <a:endParaRPr lang="en-US" dirty="0"/>
-          </a:p>
-        </p:txBody>
-      </p:sp>
       <p:pic>
         <p:nvPicPr>
-          <p:cNvPr id="4" name="Picture 3">
-            <a:extLst>
-              <a:ext uri="{FF2B5EF4-FFF2-40B4-BE49-F238E27FC236}">
-                <a16:creationId xmlns:a16="http://schemas.microsoft.com/office/drawing/2014/main" id="{C19096C2-7EF7-316B-7543-DAC693830668}"/>
+          <p:cNvPr id="5" name="Picture 4">
+            <a:extLst>
+              <a:ext uri="{FF2B5EF4-FFF2-40B4-BE49-F238E27FC236}">
+                <a16:creationId xmlns:a16="http://schemas.microsoft.com/office/drawing/2014/main" id="{07FDB131-D886-8194-386D-2E73F46FAE14}"/>
               </a:ext>
             </a:extLst>
           </p:cNvPr>
@@ -4153,8 +4276,8 @@
         </p:blipFill>
         <p:spPr>
           <a:xfrm>
-            <a:off x="2120201" y="1118753"/>
-            <a:ext cx="8675077" cy="5205046"/>
+            <a:off x="210313" y="1316736"/>
+            <a:ext cx="8370646" cy="3922776"/>
           </a:xfrm>
           <a:prstGeom prst="rect">
             <a:avLst/>
@@ -4163,10 +4286,45 @@
       </p:pic>
       <p:sp>
         <p:nvSpPr>
-          <p:cNvPr id="5" name="TextBox 4">
-            <a:extLst>
-              <a:ext uri="{FF2B5EF4-FFF2-40B4-BE49-F238E27FC236}">
-                <a16:creationId xmlns:a16="http://schemas.microsoft.com/office/drawing/2014/main" id="{8D84A3D4-EDC1-0311-2024-FC77CDA7961C}"/>
+          <p:cNvPr id="6" name="Title 1">
+            <a:extLst>
+              <a:ext uri="{FF2B5EF4-FFF2-40B4-BE49-F238E27FC236}">
+                <a16:creationId xmlns:a16="http://schemas.microsoft.com/office/drawing/2014/main" id="{7F33851A-E76F-2089-4C34-82196080B9C6}"/>
+              </a:ext>
+            </a:extLst>
+          </p:cNvPr>
+          <p:cNvSpPr>
+            <a:spLocks noGrp="1"/>
+          </p:cNvSpPr>
+          <p:nvPr>
+            <p:ph type="title"/>
+          </p:nvPr>
+        </p:nvSpPr>
+        <p:spPr>
+          <a:xfrm>
+            <a:off x="320107" y="137477"/>
+            <a:ext cx="7415717" cy="795211"/>
+          </a:xfrm>
+        </p:spPr>
+        <p:txBody>
+          <a:bodyPr>
+            <a:normAutofit/>
+          </a:bodyPr>
+          <a:lstStyle/>
+          <a:p>
+            <a:r>
+              <a:rPr lang="en-US" sz="3000" dirty="0"/>
+              <a:t>Email from Mahla about unsaturated flow...       </a:t>
+            </a:r>
+          </a:p>
+        </p:txBody>
+      </p:sp>
+      <p:sp>
+        <p:nvSpPr>
+          <p:cNvPr id="2" name="TextBox 1">
+            <a:extLst>
+              <a:ext uri="{FF2B5EF4-FFF2-40B4-BE49-F238E27FC236}">
+                <a16:creationId xmlns:a16="http://schemas.microsoft.com/office/drawing/2014/main" id="{CC786840-1DBD-07B0-8EEA-48FC720BB13A}"/>
               </a:ext>
             </a:extLst>
           </p:cNvPr>
@@ -4175,8 +4333,8 @@
         </p:nvSpPr>
         <p:spPr>
           <a:xfrm>
-            <a:off x="427054" y="2758272"/>
-            <a:ext cx="1693147" cy="1200329"/>
+            <a:off x="8690753" y="1316736"/>
+            <a:ext cx="3400728" cy="3693319"/>
           </a:xfrm>
           <a:prstGeom prst="rect">
             <a:avLst/>
@@ -4189,9 +4347,57 @@
           </a:bodyPr>
           <a:lstStyle/>
           <a:p>
+            <a:pPr marL="285750" indent="-285750">
+              <a:buFont typeface="Arial" panose="020B0604020202020204" pitchFamily="34" charset="0"/>
+              <a:buChar char="•"/>
+            </a:pPr>
+            <a:r>
+              <a:rPr lang="en-US" dirty="0">
+                <a:highlight>
+                  <a:srgbClr val="FFFF00"/>
+                </a:highlight>
+              </a:rPr>
+              <a:t>Her assumptions are technically true.</a:t>
+            </a:r>
+          </a:p>
+          <a:p>
+            <a:pPr marL="285750" indent="-285750">
+              <a:buFont typeface="Arial" panose="020B0604020202020204" pitchFamily="34" charset="0"/>
+              <a:buChar char="•"/>
+            </a:pPr>
             <a:r>
               <a:rPr lang="en-US" dirty="0"/>
-              <a:t>* SWMM is adding the most water to MF “upstream”</a:t>
+              <a:t>Too many parameters … adds complexity we didn’t have time to address</a:t>
+            </a:r>
+          </a:p>
+          <a:p>
+            <a:pPr marL="285750" indent="-285750">
+              <a:buFont typeface="Arial" panose="020B0604020202020204" pitchFamily="34" charset="0"/>
+              <a:buChar char="•"/>
+            </a:pPr>
+            <a:r>
+              <a:rPr lang="en-US" dirty="0"/>
+              <a:t>This would be more of a concern in the middle of the island as opposed to the coastal setting of PJ/GP. </a:t>
+            </a:r>
+          </a:p>
+          <a:p>
+            <a:pPr marL="285750" indent="-285750">
+              <a:buFont typeface="Arial" panose="020B0604020202020204" pitchFamily="34" charset="0"/>
+              <a:buChar char="•"/>
+            </a:pPr>
+            <a:r>
+              <a:rPr lang="en-US" dirty="0"/>
+              <a:t>Sensitivity analysis by reducing leakage. </a:t>
+            </a:r>
+          </a:p>
+          <a:p>
+            <a:pPr marL="285750" indent="-285750">
+              <a:buFont typeface="Arial" panose="020B0604020202020204" pitchFamily="34" charset="0"/>
+              <a:buChar char="•"/>
+            </a:pPr>
+            <a:r>
+              <a:rPr lang="en-US" dirty="0"/>
+              <a:t>Add this info to limitations section?</a:t>
             </a:r>
           </a:p>
         </p:txBody>
@@ -4199,7 +4405,7 @@
     </p:spTree>
     <p:extLst>
       <p:ext uri="{BB962C8B-B14F-4D97-AF65-F5344CB8AC3E}">
-        <p14:creationId xmlns:p14="http://schemas.microsoft.com/office/powerpoint/2010/main" val="3618426872"/>
+        <p14:creationId xmlns:p14="http://schemas.microsoft.com/office/powerpoint/2010/main" val="2997851357"/>
       </p:ext>
     </p:extLst>
   </p:cSld>
@@ -4226,146 +4432,6 @@
           <a:chExt cx="0" cy="0"/>
         </a:xfrm>
       </p:grpSpPr>
-      <p:sp>
-        <p:nvSpPr>
-          <p:cNvPr id="6" name="TextBox 5">
-            <a:extLst>
-              <a:ext uri="{FF2B5EF4-FFF2-40B4-BE49-F238E27FC236}">
-                <a16:creationId xmlns:a16="http://schemas.microsoft.com/office/drawing/2014/main" id="{43991A1B-965D-A360-E53E-5E997D108CC7}"/>
-              </a:ext>
-            </a:extLst>
-          </p:cNvPr>
-          <p:cNvSpPr txBox="1"/>
-          <p:nvPr/>
-        </p:nvSpPr>
-        <p:spPr>
-          <a:xfrm>
-            <a:off x="8626796" y="2679499"/>
-            <a:ext cx="3431512" cy="3416320"/>
-          </a:xfrm>
-          <a:prstGeom prst="rect">
-            <a:avLst/>
-          </a:prstGeom>
-          <a:noFill/>
-        </p:spPr>
-        <p:txBody>
-          <a:bodyPr wrap="square" rtlCol="0">
-            <a:spAutoFit/>
-          </a:bodyPr>
-          <a:lstStyle/>
-          <a:p>
-            <a:pPr marL="285750" indent="-285750">
-              <a:buFont typeface="Arial" panose="020B0604020202020204" pitchFamily="34" charset="0"/>
-              <a:buChar char="•"/>
-            </a:pPr>
-            <a:r>
-              <a:rPr lang="en-US" dirty="0"/>
-              <a:t>Have </a:t>
-            </a:r>
-            <a:r>
-              <a:rPr lang="en-US" dirty="0" err="1"/>
-              <a:t>dflow</a:t>
-            </a:r>
-            <a:r>
-              <a:rPr lang="en-US" dirty="0"/>
-              <a:t> water levels been spot checked against NOAA? (Liv)</a:t>
-            </a:r>
-          </a:p>
-          <a:p>
-            <a:pPr marL="285750" indent="-285750">
-              <a:buFont typeface="Arial" panose="020B0604020202020204" pitchFamily="34" charset="0"/>
-              <a:buChar char="•"/>
-            </a:pPr>
-            <a:r>
-              <a:rPr lang="en-US" dirty="0"/>
-              <a:t>Should Mill creek be</a:t>
-            </a:r>
-          </a:p>
-          <a:p>
-            <a:pPr marL="285750" indent="-285750">
-              <a:buFont typeface="Arial" panose="020B0604020202020204" pitchFamily="34" charset="0"/>
-              <a:buChar char="•"/>
-            </a:pPr>
-            <a:r>
-              <a:rPr lang="en-US" dirty="0"/>
-              <a:t>* clarify time in subplot titles</a:t>
-            </a:r>
-          </a:p>
-          <a:p>
-            <a:pPr marL="285750" indent="-285750">
-              <a:buFont typeface="Arial" panose="020B0604020202020204" pitchFamily="34" charset="0"/>
-              <a:buChar char="•"/>
-            </a:pPr>
-            <a:r>
-              <a:rPr lang="en-US" dirty="0"/>
-              <a:t> represented as drains? C</a:t>
-            </a:r>
-            <a:endParaRPr lang="en-US" dirty="0">
-              <a:highlight>
-                <a:srgbClr val="FFFF00"/>
-              </a:highlight>
-            </a:endParaRPr>
-          </a:p>
-          <a:p>
-            <a:pPr marL="285750" indent="-285750">
-              <a:buFont typeface="Arial" panose="020B0604020202020204" pitchFamily="34" charset="0"/>
-              <a:buChar char="•"/>
-            </a:pPr>
-            <a:r>
-              <a:rPr lang="en-US" dirty="0">
-                <a:highlight>
-                  <a:srgbClr val="FFFF00"/>
-                </a:highlight>
-              </a:rPr>
-              <a:t>Check discharge values in the drains</a:t>
-            </a:r>
-          </a:p>
-          <a:p>
-            <a:pPr marL="742950" lvl="1" indent="-285750">
-              <a:buFont typeface="Arial" panose="020B0604020202020204" pitchFamily="34" charset="0"/>
-              <a:buChar char="•"/>
-            </a:pPr>
-            <a:r>
-              <a:rPr lang="en-US" dirty="0">
-                <a:highlight>
-                  <a:srgbClr val="FFFF00"/>
-                </a:highlight>
-              </a:rPr>
-              <a:t>Mill creek in SWMM is an open channel</a:t>
-            </a:r>
-          </a:p>
-          <a:p>
-            <a:pPr marL="742950" lvl="1" indent="-285750">
-              <a:buFont typeface="Arial" panose="020B0604020202020204" pitchFamily="34" charset="0"/>
-              <a:buChar char="•"/>
-            </a:pPr>
-            <a:r>
-              <a:rPr lang="en-US" dirty="0">
-                <a:highlight>
-                  <a:srgbClr val="FFFF00"/>
-                </a:highlight>
-              </a:rPr>
-              <a:t>Send </a:t>
-            </a:r>
-            <a:r>
-              <a:rPr lang="en-US" dirty="0" err="1">
-                <a:highlight>
-                  <a:srgbClr val="FFFF00"/>
-                </a:highlight>
-              </a:rPr>
-              <a:t>vp</a:t>
-            </a:r>
-            <a:r>
-              <a:rPr lang="en-US" dirty="0">
-                <a:highlight>
-                  <a:srgbClr val="FFFF00"/>
-                </a:highlight>
-              </a:rPr>
-              <a:t> location of mill creek gage </a:t>
-            </a:r>
-          </a:p>
-        </p:txBody>
-      </p:sp>
       <p:pic>
         <p:nvPicPr>
           <p:cNvPr id="5" name="Picture 4">
@@ -4388,14 +4454,240 @@
         </p:blipFill>
         <p:spPr>
           <a:xfrm>
-            <a:off x="133692" y="255143"/>
-            <a:ext cx="9992302" cy="5333639"/>
+            <a:off x="210312" y="89020"/>
+            <a:ext cx="9276578" cy="4951604"/>
           </a:xfrm>
           <a:prstGeom prst="rect">
             <a:avLst/>
           </a:prstGeom>
         </p:spPr>
       </p:pic>
+      <p:cxnSp>
+        <p:nvCxnSpPr>
+          <p:cNvPr id="7" name="Straight Arrow Connector 6">
+            <a:extLst>
+              <a:ext uri="{FF2B5EF4-FFF2-40B4-BE49-F238E27FC236}">
+                <a16:creationId xmlns:a16="http://schemas.microsoft.com/office/drawing/2014/main" id="{44C1CA06-E9AE-B01F-4F14-914AF8B33725}"/>
+              </a:ext>
+            </a:extLst>
+          </p:cNvPr>
+          <p:cNvCxnSpPr>
+            <a:cxnSpLocks/>
+          </p:cNvCxnSpPr>
+          <p:nvPr/>
+        </p:nvCxnSpPr>
+        <p:spPr>
+          <a:xfrm flipH="1">
+            <a:off x="8748251" y="3257550"/>
+            <a:ext cx="529099" cy="0"/>
+          </a:xfrm>
+          <a:prstGeom prst="straightConnector1">
+            <a:avLst/>
+          </a:prstGeom>
+          <a:ln>
+            <a:tailEnd type="triangle"/>
+          </a:ln>
+        </p:spPr>
+        <p:style>
+          <a:lnRef idx="2">
+            <a:schemeClr val="accent1"/>
+          </a:lnRef>
+          <a:fillRef idx="0">
+            <a:schemeClr val="accent1"/>
+          </a:fillRef>
+          <a:effectRef idx="1">
+            <a:schemeClr val="accent1"/>
+          </a:effectRef>
+          <a:fontRef idx="minor">
+            <a:schemeClr val="tx1"/>
+          </a:fontRef>
+        </p:style>
+      </p:cxnSp>
+      <p:cxnSp>
+        <p:nvCxnSpPr>
+          <p:cNvPr id="9" name="Straight Arrow Connector 8">
+            <a:extLst>
+              <a:ext uri="{FF2B5EF4-FFF2-40B4-BE49-F238E27FC236}">
+                <a16:creationId xmlns:a16="http://schemas.microsoft.com/office/drawing/2014/main" id="{1BD23B6C-6246-3F1B-BA54-DD72F2693D27}"/>
+              </a:ext>
+            </a:extLst>
+          </p:cNvPr>
+          <p:cNvCxnSpPr>
+            <a:cxnSpLocks/>
+          </p:cNvCxnSpPr>
+          <p:nvPr/>
+        </p:nvCxnSpPr>
+        <p:spPr>
+          <a:xfrm flipH="1">
+            <a:off x="8748251" y="2409825"/>
+            <a:ext cx="529099" cy="0"/>
+          </a:xfrm>
+          <a:prstGeom prst="straightConnector1">
+            <a:avLst/>
+          </a:prstGeom>
+          <a:ln>
+            <a:tailEnd type="triangle"/>
+          </a:ln>
+        </p:spPr>
+        <p:style>
+          <a:lnRef idx="2">
+            <a:schemeClr val="accent1"/>
+          </a:lnRef>
+          <a:fillRef idx="0">
+            <a:schemeClr val="accent1"/>
+          </a:fillRef>
+          <a:effectRef idx="1">
+            <a:schemeClr val="accent1"/>
+          </a:effectRef>
+          <a:fontRef idx="minor">
+            <a:schemeClr val="tx1"/>
+          </a:fontRef>
+        </p:style>
+      </p:cxnSp>
+      <p:sp>
+        <p:nvSpPr>
+          <p:cNvPr id="10" name="TextBox 9">
+            <a:extLst>
+              <a:ext uri="{FF2B5EF4-FFF2-40B4-BE49-F238E27FC236}">
+                <a16:creationId xmlns:a16="http://schemas.microsoft.com/office/drawing/2014/main" id="{2FC9EA1A-10B5-F2D6-F7BC-8DCA25EFF7D4}"/>
+              </a:ext>
+            </a:extLst>
+          </p:cNvPr>
+          <p:cNvSpPr txBox="1"/>
+          <p:nvPr/>
+        </p:nvSpPr>
+        <p:spPr>
+          <a:xfrm>
+            <a:off x="9277350" y="3072884"/>
+            <a:ext cx="838200" cy="369332"/>
+          </a:xfrm>
+          <a:prstGeom prst="rect">
+            <a:avLst/>
+          </a:prstGeom>
+          <a:noFill/>
+        </p:spPr>
+        <p:txBody>
+          <a:bodyPr wrap="square" rtlCol="0">
+            <a:spAutoFit/>
+          </a:bodyPr>
+          <a:lstStyle/>
+          <a:p>
+            <a:r>
+              <a:rPr lang="en-US" dirty="0"/>
+              <a:t>CHD</a:t>
+            </a:r>
+          </a:p>
+        </p:txBody>
+      </p:sp>
+      <p:sp>
+        <p:nvSpPr>
+          <p:cNvPr id="11" name="TextBox 10">
+            <a:extLst>
+              <a:ext uri="{FF2B5EF4-FFF2-40B4-BE49-F238E27FC236}">
+                <a16:creationId xmlns:a16="http://schemas.microsoft.com/office/drawing/2014/main" id="{5FA3659F-AF33-FBFE-00F3-4BB16F2DA038}"/>
+              </a:ext>
+            </a:extLst>
+          </p:cNvPr>
+          <p:cNvSpPr txBox="1"/>
+          <p:nvPr/>
+        </p:nvSpPr>
+        <p:spPr>
+          <a:xfrm>
+            <a:off x="9277350" y="2195097"/>
+            <a:ext cx="685800" cy="369332"/>
+          </a:xfrm>
+          <a:prstGeom prst="rect">
+            <a:avLst/>
+          </a:prstGeom>
+          <a:noFill/>
+        </p:spPr>
+        <p:txBody>
+          <a:bodyPr wrap="square" rtlCol="0">
+            <a:spAutoFit/>
+          </a:bodyPr>
+          <a:lstStyle/>
+          <a:p>
+            <a:r>
+              <a:rPr lang="en-US" dirty="0"/>
+              <a:t>DRN</a:t>
+            </a:r>
+          </a:p>
+        </p:txBody>
+      </p:sp>
+      <p:sp>
+        <p:nvSpPr>
+          <p:cNvPr id="6" name="TextBox 5">
+            <a:extLst>
+              <a:ext uri="{FF2B5EF4-FFF2-40B4-BE49-F238E27FC236}">
+                <a16:creationId xmlns:a16="http://schemas.microsoft.com/office/drawing/2014/main" id="{43991A1B-965D-A360-E53E-5E997D108CC7}"/>
+              </a:ext>
+            </a:extLst>
+          </p:cNvPr>
+          <p:cNvSpPr txBox="1"/>
+          <p:nvPr/>
+        </p:nvSpPr>
+        <p:spPr>
+          <a:xfrm>
+            <a:off x="7022592" y="5239074"/>
+            <a:ext cx="4941547" cy="1477328"/>
+          </a:xfrm>
+          <a:prstGeom prst="rect">
+            <a:avLst/>
+          </a:prstGeom>
+          <a:noFill/>
+        </p:spPr>
+        <p:txBody>
+          <a:bodyPr wrap="square" rtlCol="0">
+            <a:spAutoFit/>
+          </a:bodyPr>
+          <a:lstStyle/>
+          <a:p>
+            <a:pPr marL="285750" indent="-285750">
+              <a:buFont typeface="Arial" panose="020B0604020202020204" pitchFamily="34" charset="0"/>
+              <a:buChar char="•"/>
+            </a:pPr>
+            <a:r>
+              <a:rPr lang="en-US" dirty="0"/>
+              <a:t>Have </a:t>
+            </a:r>
+            <a:r>
+              <a:rPr lang="en-US" dirty="0" err="1"/>
+              <a:t>dflow</a:t>
+            </a:r>
+            <a:r>
+              <a:rPr lang="en-US" dirty="0"/>
+              <a:t> water levels been spot checked against NOAA? (Liv)</a:t>
+            </a:r>
+          </a:p>
+          <a:p>
+            <a:pPr marL="742950" lvl="1" indent="-285750">
+              <a:buFont typeface="Arial" panose="020B0604020202020204" pitchFamily="34" charset="0"/>
+              <a:buChar char="•"/>
+            </a:pPr>
+            <a:r>
+              <a:rPr lang="en-US" dirty="0"/>
+              <a:t>2010 – something about wind, Liv is looking at this. </a:t>
+            </a:r>
+          </a:p>
+          <a:p>
+            <a:pPr marL="742950" lvl="1" indent="-285750">
+              <a:buFont typeface="Arial" panose="020B0604020202020204" pitchFamily="34" charset="0"/>
+              <a:buChar char="•"/>
+            </a:pPr>
+            <a:r>
+              <a:rPr lang="en-US" dirty="0">
+                <a:solidFill>
+                  <a:srgbClr val="FF0000"/>
+                </a:solidFill>
+                <a:highlight>
+                  <a:srgbClr val="FFFF00"/>
+                </a:highlight>
+              </a:rPr>
+              <a:t>2018- in progress</a:t>
+            </a:r>
+          </a:p>
+        </p:txBody>
+      </p:sp>
     </p:spTree>
     <p:extLst>
       <p:ext uri="{BB962C8B-B14F-4D97-AF65-F5344CB8AC3E}">
@@ -4426,11 +4718,1029 @@
           <a:chExt cx="0" cy="0"/>
         </a:xfrm>
       </p:grpSpPr>
+      <p:pic>
+        <p:nvPicPr>
+          <p:cNvPr id="16" name="Picture 15">
+            <a:extLst>
+              <a:ext uri="{FF2B5EF4-FFF2-40B4-BE49-F238E27FC236}">
+                <a16:creationId xmlns:a16="http://schemas.microsoft.com/office/drawing/2014/main" id="{BD11C15F-10C7-121E-C0DF-D73F9BB0B1A1}"/>
+              </a:ext>
+            </a:extLst>
+          </p:cNvPr>
+          <p:cNvPicPr>
+            <a:picLocks noChangeAspect="1"/>
+          </p:cNvPicPr>
+          <p:nvPr/>
+        </p:nvPicPr>
+        <p:blipFill>
+          <a:blip r:embed="rId2"/>
+          <a:stretch>
+            <a:fillRect/>
+          </a:stretch>
+        </p:blipFill>
+        <p:spPr>
+          <a:xfrm>
+            <a:off x="244287" y="1181281"/>
+            <a:ext cx="9693533" cy="5144086"/>
+          </a:xfrm>
+          <a:prstGeom prst="rect">
+            <a:avLst/>
+          </a:prstGeom>
+        </p:spPr>
+      </p:pic>
+      <p:sp>
+        <p:nvSpPr>
+          <p:cNvPr id="4" name="Title 1">
+            <a:extLst>
+              <a:ext uri="{FF2B5EF4-FFF2-40B4-BE49-F238E27FC236}">
+                <a16:creationId xmlns:a16="http://schemas.microsoft.com/office/drawing/2014/main" id="{E56744F6-8480-2FF3-8CD8-E4F0DBE0D545}"/>
+              </a:ext>
+            </a:extLst>
+          </p:cNvPr>
+          <p:cNvSpPr txBox="1">
+            <a:spLocks/>
+          </p:cNvSpPr>
+          <p:nvPr/>
+        </p:nvSpPr>
+        <p:spPr>
+          <a:xfrm>
+            <a:off x="1566672" y="0"/>
+            <a:ext cx="7267575" cy="1325563"/>
+          </a:xfrm>
+          <a:prstGeom prst="rect">
+            <a:avLst/>
+          </a:prstGeom>
+        </p:spPr>
+        <p:txBody>
+          <a:bodyPr vert="horz" lIns="91440" tIns="45720" rIns="91440" bIns="45720" rtlCol="0" anchor="ctr">
+            <a:normAutofit/>
+          </a:bodyPr>
+          <a:lstStyle>
+            <a:lvl1pPr algn="l" defTabSz="914400" rtl="0" eaLnBrk="1" latinLnBrk="0" hangingPunct="1">
+              <a:lnSpc>
+                <a:spcPct val="90000"/>
+              </a:lnSpc>
+              <a:spcBef>
+                <a:spcPct val="0"/>
+              </a:spcBef>
+              <a:buNone/>
+              <a:defRPr sz="4400" kern="1200">
+                <a:solidFill>
+                  <a:schemeClr val="tx1"/>
+                </a:solidFill>
+                <a:latin typeface="+mj-lt"/>
+                <a:ea typeface="+mj-ea"/>
+                <a:cs typeface="+mj-cs"/>
+              </a:defRPr>
+            </a:lvl1pPr>
+          </a:lstStyle>
+          <a:p>
+            <a:r>
+              <a:rPr lang="en-US" dirty="0"/>
+              <a:t>MF + D-Flow+ SWMM (daily)        </a:t>
+            </a:r>
+          </a:p>
+        </p:txBody>
+      </p:sp>
+      <p:sp>
+        <p:nvSpPr>
+          <p:cNvPr id="14" name="TextBox 13">
+            <a:extLst>
+              <a:ext uri="{FF2B5EF4-FFF2-40B4-BE49-F238E27FC236}">
+                <a16:creationId xmlns:a16="http://schemas.microsoft.com/office/drawing/2014/main" id="{26F9EBA1-F34D-E884-662B-89A9087D3D0A}"/>
+              </a:ext>
+            </a:extLst>
+          </p:cNvPr>
+          <p:cNvSpPr txBox="1"/>
+          <p:nvPr/>
+        </p:nvSpPr>
+        <p:spPr>
+          <a:xfrm>
+            <a:off x="9096330" y="2149490"/>
+            <a:ext cx="3003219" cy="1754326"/>
+          </a:xfrm>
+          <a:prstGeom prst="rect">
+            <a:avLst/>
+          </a:prstGeom>
+          <a:noFill/>
+        </p:spPr>
+        <p:txBody>
+          <a:bodyPr wrap="square" rtlCol="0">
+            <a:spAutoFit/>
+          </a:bodyPr>
+          <a:lstStyle/>
+          <a:p>
+            <a:pPr marL="285750" indent="-285750">
+              <a:buFont typeface="Arial" panose="020B0604020202020204" pitchFamily="34" charset="0"/>
+              <a:buChar char="•"/>
+            </a:pPr>
+            <a:r>
+              <a:rPr lang="en-US" dirty="0"/>
+              <a:t>Heads at select locations within the SWMM well network </a:t>
+            </a:r>
+          </a:p>
+          <a:p>
+            <a:pPr marL="285750" indent="-285750">
+              <a:buFont typeface="Arial" panose="020B0604020202020204" pitchFamily="34" charset="0"/>
+              <a:buChar char="•"/>
+            </a:pPr>
+            <a:r>
+              <a:rPr lang="en-US" dirty="0">
+                <a:highlight>
+                  <a:srgbClr val="FFFF00"/>
+                </a:highlight>
+              </a:rPr>
+              <a:t>SWMM coupling does not significantly change heads </a:t>
+            </a:r>
+          </a:p>
+        </p:txBody>
+      </p:sp>
+    </p:spTree>
+    <p:extLst>
+      <p:ext uri="{BB962C8B-B14F-4D97-AF65-F5344CB8AC3E}">
+        <p14:creationId xmlns:p14="http://schemas.microsoft.com/office/powerpoint/2010/main" val="3377756592"/>
+      </p:ext>
+    </p:extLst>
+  </p:cSld>
+  <p:clrMapOvr>
+    <a:masterClrMapping/>
+  </p:clrMapOvr>
+</p:sld>
+</file>
+
+<file path=ppt/slides/slide6.xml><?xml version="1.0" encoding="utf-8"?>
+<p:sld xmlns:a="http://schemas.openxmlformats.org/drawingml/2006/main" xmlns:r="http://schemas.openxmlformats.org/officeDocument/2006/relationships" xmlns:p="http://schemas.openxmlformats.org/presentationml/2006/main">
+  <p:cSld>
+    <p:spTree>
+      <p:nvGrpSpPr>
+        <p:cNvPr id="1" name=""/>
+        <p:cNvGrpSpPr/>
+        <p:nvPr/>
+      </p:nvGrpSpPr>
+      <p:grpSpPr>
+        <a:xfrm>
+          <a:off x="0" y="0"/>
+          <a:ext cx="0" cy="0"/>
+          <a:chOff x="0" y="0"/>
+          <a:chExt cx="0" cy="0"/>
+        </a:xfrm>
+      </p:grpSpPr>
+      <p:pic>
+        <p:nvPicPr>
+          <p:cNvPr id="4" name="Picture 3">
+            <a:extLst>
+              <a:ext uri="{FF2B5EF4-FFF2-40B4-BE49-F238E27FC236}">
+                <a16:creationId xmlns:a16="http://schemas.microsoft.com/office/drawing/2014/main" id="{C19096C2-7EF7-316B-7543-DAC693830668}"/>
+              </a:ext>
+            </a:extLst>
+          </p:cNvPr>
+          <p:cNvPicPr>
+            <a:picLocks noChangeAspect="1"/>
+          </p:cNvPicPr>
+          <p:nvPr/>
+        </p:nvPicPr>
+        <p:blipFill>
+          <a:blip r:embed="rId2"/>
+          <a:stretch>
+            <a:fillRect/>
+          </a:stretch>
+        </p:blipFill>
+        <p:spPr>
+          <a:xfrm>
+            <a:off x="0" y="0"/>
+            <a:ext cx="8694536" cy="5216722"/>
+          </a:xfrm>
+          <a:prstGeom prst="rect">
+            <a:avLst/>
+          </a:prstGeom>
+        </p:spPr>
+      </p:pic>
+      <p:sp>
+        <p:nvSpPr>
+          <p:cNvPr id="5" name="TextBox 4">
+            <a:extLst>
+              <a:ext uri="{FF2B5EF4-FFF2-40B4-BE49-F238E27FC236}">
+                <a16:creationId xmlns:a16="http://schemas.microsoft.com/office/drawing/2014/main" id="{8D84A3D4-EDC1-0311-2024-FC77CDA7961C}"/>
+              </a:ext>
+            </a:extLst>
+          </p:cNvPr>
+          <p:cNvSpPr txBox="1"/>
+          <p:nvPr/>
+        </p:nvSpPr>
+        <p:spPr>
+          <a:xfrm>
+            <a:off x="1805412" y="4844239"/>
+            <a:ext cx="3735851" cy="2031325"/>
+          </a:xfrm>
+          <a:prstGeom prst="rect">
+            <a:avLst/>
+          </a:prstGeom>
+          <a:noFill/>
+        </p:spPr>
+        <p:txBody>
+          <a:bodyPr wrap="square" rtlCol="0">
+            <a:spAutoFit/>
+          </a:bodyPr>
+          <a:lstStyle/>
+          <a:p>
+            <a:pPr marL="285750" indent="-285750">
+              <a:buFont typeface="Arial" panose="020B0604020202020204" pitchFamily="34" charset="0"/>
+              <a:buChar char="•"/>
+            </a:pPr>
+            <a:r>
+              <a:rPr lang="en-US" dirty="0"/>
+              <a:t>SWMM adding water to mf</a:t>
+            </a:r>
+          </a:p>
+          <a:p>
+            <a:pPr marL="285750" indent="-285750">
+              <a:buFont typeface="Arial" panose="020B0604020202020204" pitchFamily="34" charset="0"/>
+              <a:buChar char="•"/>
+            </a:pPr>
+            <a:r>
+              <a:rPr lang="en-US" dirty="0"/>
+              <a:t>SWMM is adding the most water to MF “upstream”</a:t>
+            </a:r>
+          </a:p>
+          <a:p>
+            <a:pPr marL="285750" indent="-285750">
+              <a:buFont typeface="Arial" panose="020B0604020202020204" pitchFamily="34" charset="0"/>
+              <a:buChar char="•"/>
+            </a:pPr>
+            <a:r>
+              <a:rPr lang="en-US" dirty="0">
+                <a:highlight>
+                  <a:srgbClr val="FFFF00"/>
+                </a:highlight>
+              </a:rPr>
+              <a:t>Plot </a:t>
+            </a:r>
+            <a:r>
+              <a:rPr lang="en-US" dirty="0" err="1">
+                <a:highlight>
+                  <a:srgbClr val="FFFF00"/>
+                </a:highlight>
+              </a:rPr>
+              <a:t>downsewer</a:t>
+            </a:r>
+            <a:r>
+              <a:rPr lang="en-US" dirty="0">
+                <a:highlight>
+                  <a:srgbClr val="FFFF00"/>
+                </a:highlight>
+              </a:rPr>
+              <a:t> time series after units have been fixed</a:t>
+            </a:r>
+          </a:p>
+          <a:p>
+            <a:pPr marL="285750" indent="-285750">
+              <a:buFont typeface="Arial" panose="020B0604020202020204" pitchFamily="34" charset="0"/>
+              <a:buChar char="•"/>
+            </a:pPr>
+            <a:endParaRPr lang="en-US" dirty="0"/>
+          </a:p>
+          <a:p>
+            <a:pPr marL="285750" indent="-285750">
+              <a:buFont typeface="Arial" panose="020B0604020202020204" pitchFamily="34" charset="0"/>
+              <a:buChar char="•"/>
+            </a:pPr>
+            <a:endParaRPr lang="en-US" dirty="0"/>
+          </a:p>
+        </p:txBody>
+      </p:sp>
+      <p:pic>
+        <p:nvPicPr>
+          <p:cNvPr id="6" name="Picture 5">
+            <a:extLst>
+              <a:ext uri="{FF2B5EF4-FFF2-40B4-BE49-F238E27FC236}">
+                <a16:creationId xmlns:a16="http://schemas.microsoft.com/office/drawing/2014/main" id="{DDD67B82-9A1E-6CFD-9F8B-DD8F6A5A92C2}"/>
+              </a:ext>
+            </a:extLst>
+          </p:cNvPr>
+          <p:cNvPicPr>
+            <a:picLocks noChangeAspect="1"/>
+          </p:cNvPicPr>
+          <p:nvPr/>
+        </p:nvPicPr>
+        <p:blipFill>
+          <a:blip r:embed="rId3"/>
+          <a:stretch>
+            <a:fillRect/>
+          </a:stretch>
+        </p:blipFill>
+        <p:spPr>
+          <a:xfrm>
+            <a:off x="8775778" y="694073"/>
+            <a:ext cx="3097631" cy="2435066"/>
+          </a:xfrm>
+          <a:prstGeom prst="rect">
+            <a:avLst/>
+          </a:prstGeom>
+        </p:spPr>
+      </p:pic>
+      <p:sp>
+        <p:nvSpPr>
+          <p:cNvPr id="9" name="Title 1">
+            <a:extLst>
+              <a:ext uri="{FF2B5EF4-FFF2-40B4-BE49-F238E27FC236}">
+                <a16:creationId xmlns:a16="http://schemas.microsoft.com/office/drawing/2014/main" id="{6184535E-00F4-7042-2562-3919E55BB5B3}"/>
+              </a:ext>
+            </a:extLst>
+          </p:cNvPr>
+          <p:cNvSpPr txBox="1">
+            <a:spLocks noGrp="1"/>
+          </p:cNvSpPr>
+          <p:nvPr>
+            <p:ph type="title"/>
+          </p:nvPr>
+        </p:nvSpPr>
+        <p:spPr>
+          <a:xfrm>
+            <a:off x="2925384" y="31292"/>
+            <a:ext cx="5453270" cy="1325563"/>
+          </a:xfrm>
+          <a:prstGeom prst="rect">
+            <a:avLst/>
+          </a:prstGeom>
+        </p:spPr>
+        <p:txBody>
+          <a:bodyPr vert="horz" lIns="91440" tIns="45720" rIns="91440" bIns="45720" rtlCol="0" anchor="ctr">
+            <a:normAutofit/>
+          </a:bodyPr>
+          <a:lstStyle>
+            <a:lvl1pPr algn="l" defTabSz="914400" rtl="0" eaLnBrk="1" latinLnBrk="0" hangingPunct="1">
+              <a:lnSpc>
+                <a:spcPct val="90000"/>
+              </a:lnSpc>
+              <a:spcBef>
+                <a:spcPct val="0"/>
+              </a:spcBef>
+              <a:buNone/>
+              <a:defRPr sz="4400" kern="1200">
+                <a:solidFill>
+                  <a:schemeClr val="tx1"/>
+                </a:solidFill>
+                <a:latin typeface="+mj-lt"/>
+                <a:ea typeface="+mj-ea"/>
+                <a:cs typeface="+mj-cs"/>
+              </a:defRPr>
+            </a:lvl1pPr>
+          </a:lstStyle>
+          <a:p>
+            <a:pPr algn="ctr"/>
+            <a:r>
+              <a:rPr lang="en-US" sz="3500" dirty="0"/>
+              <a:t>MF + D-Flow+ SWMM (daily)</a:t>
+            </a:r>
+            <a:br>
+              <a:rPr lang="en-US" sz="3500" dirty="0"/>
+            </a:br>
+            <a:r>
+              <a:rPr lang="en-US" sz="2500" dirty="0"/>
+              <a:t>Well Observations (flux)        </a:t>
+            </a:r>
+          </a:p>
+        </p:txBody>
+      </p:sp>
+      <p:pic>
+        <p:nvPicPr>
+          <p:cNvPr id="11" name="Picture 10">
+            <a:extLst>
+              <a:ext uri="{FF2B5EF4-FFF2-40B4-BE49-F238E27FC236}">
+                <a16:creationId xmlns:a16="http://schemas.microsoft.com/office/drawing/2014/main" id="{B4C9F3E3-047F-7FEC-7942-A6090B3EED58}"/>
+              </a:ext>
+            </a:extLst>
+          </p:cNvPr>
+          <p:cNvPicPr>
+            <a:picLocks noChangeAspect="1"/>
+          </p:cNvPicPr>
+          <p:nvPr/>
+        </p:nvPicPr>
+        <p:blipFill>
+          <a:blip r:embed="rId4"/>
+          <a:stretch>
+            <a:fillRect/>
+          </a:stretch>
+        </p:blipFill>
+        <p:spPr>
+          <a:xfrm>
+            <a:off x="7153275" y="3224314"/>
+            <a:ext cx="4406374" cy="3374251"/>
+          </a:xfrm>
+          <a:prstGeom prst="rect">
+            <a:avLst/>
+          </a:prstGeom>
+        </p:spPr>
+      </p:pic>
+      <p:sp>
+        <p:nvSpPr>
+          <p:cNvPr id="2" name="Rectangle 1">
+            <a:extLst>
+              <a:ext uri="{FF2B5EF4-FFF2-40B4-BE49-F238E27FC236}">
+                <a16:creationId xmlns:a16="http://schemas.microsoft.com/office/drawing/2014/main" id="{9874DEB4-9BB6-7CC9-B355-CCBCADA115B4}"/>
+              </a:ext>
+            </a:extLst>
+          </p:cNvPr>
+          <p:cNvSpPr/>
+          <p:nvPr/>
+        </p:nvSpPr>
+        <p:spPr>
+          <a:xfrm>
+            <a:off x="1457325" y="1724025"/>
+            <a:ext cx="657225" cy="552450"/>
+          </a:xfrm>
+          <a:prstGeom prst="rect">
+            <a:avLst/>
+          </a:prstGeom>
+          <a:noFill/>
+          <a:ln w="38100">
+            <a:solidFill>
+              <a:schemeClr val="accent6">
+                <a:lumMod val="50000"/>
+              </a:schemeClr>
+            </a:solidFill>
+          </a:ln>
+        </p:spPr>
+        <p:style>
+          <a:lnRef idx="2">
+            <a:schemeClr val="accent1">
+              <a:shade val="15000"/>
+            </a:schemeClr>
+          </a:lnRef>
+          <a:fillRef idx="1">
+            <a:schemeClr val="accent1"/>
+          </a:fillRef>
+          <a:effectRef idx="0">
+            <a:schemeClr val="accent1"/>
+          </a:effectRef>
+          <a:fontRef idx="minor">
+            <a:schemeClr val="lt1"/>
+          </a:fontRef>
+        </p:style>
+        <p:txBody>
+          <a:bodyPr rtlCol="0" anchor="ctr"/>
+          <a:lstStyle/>
+          <a:p>
+            <a:pPr algn="ctr"/>
+            <a:endParaRPr lang="en-US"/>
+          </a:p>
+        </p:txBody>
+      </p:sp>
+    </p:spTree>
+    <p:extLst>
+      <p:ext uri="{BB962C8B-B14F-4D97-AF65-F5344CB8AC3E}">
+        <p14:creationId xmlns:p14="http://schemas.microsoft.com/office/powerpoint/2010/main" val="3618426872"/>
+      </p:ext>
+    </p:extLst>
+  </p:cSld>
+  <p:clrMapOvr>
+    <a:masterClrMapping/>
+  </p:clrMapOvr>
+</p:sld>
+</file>
+
+<file path=ppt/slides/slide7.xml><?xml version="1.0" encoding="utf-8"?>
+<p:sld xmlns:a="http://schemas.openxmlformats.org/drawingml/2006/main" xmlns:r="http://schemas.openxmlformats.org/officeDocument/2006/relationships" xmlns:p="http://schemas.openxmlformats.org/presentationml/2006/main">
+  <p:cSld>
+    <p:spTree>
+      <p:nvGrpSpPr>
+        <p:cNvPr id="1" name=""/>
+        <p:cNvGrpSpPr/>
+        <p:nvPr/>
+      </p:nvGrpSpPr>
+      <p:grpSpPr>
+        <a:xfrm>
+          <a:off x="0" y="0"/>
+          <a:ext cx="0" cy="0"/>
+          <a:chOff x="0" y="0"/>
+          <a:chExt cx="0" cy="0"/>
+        </a:xfrm>
+      </p:grpSpPr>
+      <p:pic>
+        <p:nvPicPr>
+          <p:cNvPr id="5" name="Picture 4">
+            <a:extLst>
+              <a:ext uri="{FF2B5EF4-FFF2-40B4-BE49-F238E27FC236}">
+                <a16:creationId xmlns:a16="http://schemas.microsoft.com/office/drawing/2014/main" id="{98CBDF0E-9239-DD85-C18E-3DE3E461268D}"/>
+              </a:ext>
+            </a:extLst>
+          </p:cNvPr>
+          <p:cNvPicPr>
+            <a:picLocks noChangeAspect="1"/>
+          </p:cNvPicPr>
+          <p:nvPr/>
+        </p:nvPicPr>
+        <p:blipFill>
+          <a:blip r:embed="rId2"/>
+          <a:stretch>
+            <a:fillRect/>
+          </a:stretch>
+        </p:blipFill>
+        <p:spPr>
+          <a:xfrm>
+            <a:off x="4599265" y="275675"/>
+            <a:ext cx="4464874" cy="6035674"/>
+          </a:xfrm>
+          <a:prstGeom prst="rect">
+            <a:avLst/>
+          </a:prstGeom>
+        </p:spPr>
+      </p:pic>
+      <p:sp>
+        <p:nvSpPr>
+          <p:cNvPr id="6" name="TextBox 5">
+            <a:extLst>
+              <a:ext uri="{FF2B5EF4-FFF2-40B4-BE49-F238E27FC236}">
+                <a16:creationId xmlns:a16="http://schemas.microsoft.com/office/drawing/2014/main" id="{5858FDB6-F29C-0021-E887-47C08D66F7CA}"/>
+              </a:ext>
+            </a:extLst>
+          </p:cNvPr>
+          <p:cNvSpPr txBox="1"/>
+          <p:nvPr/>
+        </p:nvSpPr>
+        <p:spPr>
+          <a:xfrm>
+            <a:off x="6096000" y="2415209"/>
+            <a:ext cx="2968139" cy="1659834"/>
+          </a:xfrm>
+          <a:prstGeom prst="rect">
+            <a:avLst/>
+          </a:prstGeom>
+          <a:noFill/>
+          <a:ln w="19050">
+            <a:solidFill>
+              <a:srgbClr val="00B050"/>
+            </a:solidFill>
+          </a:ln>
+        </p:spPr>
+        <p:txBody>
+          <a:bodyPr wrap="square" rtlCol="0">
+            <a:spAutoFit/>
+          </a:bodyPr>
+          <a:lstStyle/>
+          <a:p>
+            <a:endParaRPr lang="en-US" dirty="0"/>
+          </a:p>
+        </p:txBody>
+      </p:sp>
+      <p:cxnSp>
+        <p:nvCxnSpPr>
+          <p:cNvPr id="8" name="Straight Arrow Connector 7">
+            <a:extLst>
+              <a:ext uri="{FF2B5EF4-FFF2-40B4-BE49-F238E27FC236}">
+                <a16:creationId xmlns:a16="http://schemas.microsoft.com/office/drawing/2014/main" id="{50B664D1-F57D-F6B0-F37D-742D400A1C28}"/>
+              </a:ext>
+            </a:extLst>
+          </p:cNvPr>
+          <p:cNvCxnSpPr/>
+          <p:nvPr/>
+        </p:nvCxnSpPr>
+        <p:spPr>
+          <a:xfrm flipH="1">
+            <a:off x="9064139" y="2581275"/>
+            <a:ext cx="394186" cy="133350"/>
+          </a:xfrm>
+          <a:prstGeom prst="straightConnector1">
+            <a:avLst/>
+          </a:prstGeom>
+          <a:ln>
+            <a:tailEnd type="triangle"/>
+          </a:ln>
+        </p:spPr>
+        <p:style>
+          <a:lnRef idx="2">
+            <a:schemeClr val="accent1"/>
+          </a:lnRef>
+          <a:fillRef idx="0">
+            <a:schemeClr val="accent1"/>
+          </a:fillRef>
+          <a:effectRef idx="1">
+            <a:schemeClr val="accent1"/>
+          </a:effectRef>
+          <a:fontRef idx="minor">
+            <a:schemeClr val="tx1"/>
+          </a:fontRef>
+        </p:style>
+      </p:cxnSp>
+      <p:sp>
+        <p:nvSpPr>
+          <p:cNvPr id="9" name="TextBox 8">
+            <a:extLst>
+              <a:ext uri="{FF2B5EF4-FFF2-40B4-BE49-F238E27FC236}">
+                <a16:creationId xmlns:a16="http://schemas.microsoft.com/office/drawing/2014/main" id="{1987C660-F526-BBB6-CCF2-23583C5074CE}"/>
+              </a:ext>
+            </a:extLst>
+          </p:cNvPr>
+          <p:cNvSpPr txBox="1"/>
+          <p:nvPr/>
+        </p:nvSpPr>
+        <p:spPr>
+          <a:xfrm>
+            <a:off x="9610344" y="2343150"/>
+            <a:ext cx="2421933" cy="923330"/>
+          </a:xfrm>
+          <a:prstGeom prst="rect">
+            <a:avLst/>
+          </a:prstGeom>
+          <a:noFill/>
+        </p:spPr>
+        <p:txBody>
+          <a:bodyPr wrap="square" rtlCol="0">
+            <a:spAutoFit/>
+          </a:bodyPr>
+          <a:lstStyle/>
+          <a:p>
+            <a:r>
+              <a:rPr lang="en-US" dirty="0"/>
+              <a:t>Ft^3/day *</a:t>
+            </a:r>
+          </a:p>
+          <a:p>
+            <a:r>
+              <a:rPr lang="en-US" dirty="0"/>
+              <a:t>(15 [mins]/1440 [mins/day])</a:t>
+            </a:r>
+          </a:p>
+        </p:txBody>
+      </p:sp>
+      <p:pic>
+        <p:nvPicPr>
+          <p:cNvPr id="11" name="Picture 10">
+            <a:extLst>
+              <a:ext uri="{FF2B5EF4-FFF2-40B4-BE49-F238E27FC236}">
+                <a16:creationId xmlns:a16="http://schemas.microsoft.com/office/drawing/2014/main" id="{D2D9D272-84BF-E6B0-7EEC-289CBF7C8271}"/>
+              </a:ext>
+            </a:extLst>
+          </p:cNvPr>
+          <p:cNvPicPr>
+            <a:picLocks noChangeAspect="1"/>
+          </p:cNvPicPr>
+          <p:nvPr/>
+        </p:nvPicPr>
+        <p:blipFill>
+          <a:blip r:embed="rId3"/>
+          <a:stretch>
+            <a:fillRect/>
+          </a:stretch>
+        </p:blipFill>
+        <p:spPr>
+          <a:xfrm>
+            <a:off x="429322" y="4289424"/>
+            <a:ext cx="3160905" cy="2305601"/>
+          </a:xfrm>
+          <a:prstGeom prst="rect">
+            <a:avLst/>
+          </a:prstGeom>
+        </p:spPr>
+      </p:pic>
       <p:sp>
         <p:nvSpPr>
           <p:cNvPr id="2" name="Title 1">
             <a:extLst>
               <a:ext uri="{FF2B5EF4-FFF2-40B4-BE49-F238E27FC236}">
+                <a16:creationId xmlns:a16="http://schemas.microsoft.com/office/drawing/2014/main" id="{46C0A2D1-9725-E7A9-05FA-A1E0AB282B00}"/>
+              </a:ext>
+            </a:extLst>
+          </p:cNvPr>
+          <p:cNvSpPr>
+            <a:spLocks noGrp="1"/>
+          </p:cNvSpPr>
+          <p:nvPr>
+            <p:ph type="title"/>
+          </p:nvPr>
+        </p:nvSpPr>
+        <p:spPr>
+          <a:xfrm>
+            <a:off x="157644" y="220238"/>
+            <a:ext cx="3160905" cy="2305601"/>
+          </a:xfrm>
+        </p:spPr>
+        <p:txBody>
+          <a:bodyPr>
+            <a:normAutofit/>
+          </a:bodyPr>
+          <a:lstStyle/>
+          <a:p>
+            <a:r>
+              <a:rPr lang="en-US" sz="2400" dirty="0">
+                <a:highlight>
+                  <a:srgbClr val="FFFF00"/>
+                </a:highlight>
+              </a:rPr>
+              <a:t>Do I need to divide sum by the coupling interval (</a:t>
+            </a:r>
+            <a:r>
+              <a:rPr lang="en-US" sz="2400" dirty="0" err="1">
+                <a:highlight>
+                  <a:srgbClr val="FFFF00"/>
+                </a:highlight>
+              </a:rPr>
+              <a:t>eg.</a:t>
+            </a:r>
+            <a:r>
+              <a:rPr lang="en-US" sz="2400" dirty="0">
+                <a:highlight>
+                  <a:srgbClr val="FFFF00"/>
+                </a:highlight>
+              </a:rPr>
+              <a:t> Divide by 96 for 15min coupling interval)?</a:t>
+            </a:r>
+          </a:p>
+        </p:txBody>
+      </p:sp>
+      <p:sp>
+        <p:nvSpPr>
+          <p:cNvPr id="14" name="Rectangle 13">
+            <a:extLst>
+              <a:ext uri="{FF2B5EF4-FFF2-40B4-BE49-F238E27FC236}">
+                <a16:creationId xmlns:a16="http://schemas.microsoft.com/office/drawing/2014/main" id="{865D6860-C528-D39E-CBEA-35A1D3241E7F}"/>
+              </a:ext>
+            </a:extLst>
+          </p:cNvPr>
+          <p:cNvSpPr/>
+          <p:nvPr/>
+        </p:nvSpPr>
+        <p:spPr>
+          <a:xfrm>
+            <a:off x="4599265" y="6048375"/>
+            <a:ext cx="4464874" cy="262974"/>
+          </a:xfrm>
+          <a:prstGeom prst="rect">
+            <a:avLst/>
+          </a:prstGeom>
+          <a:noFill/>
+          <a:ln w="38100">
+            <a:solidFill>
+              <a:schemeClr val="accent2">
+                <a:lumMod val="75000"/>
+              </a:schemeClr>
+            </a:solidFill>
+          </a:ln>
+        </p:spPr>
+        <p:style>
+          <a:lnRef idx="2">
+            <a:schemeClr val="accent1">
+              <a:shade val="15000"/>
+            </a:schemeClr>
+          </a:lnRef>
+          <a:fillRef idx="1">
+            <a:schemeClr val="accent1"/>
+          </a:fillRef>
+          <a:effectRef idx="0">
+            <a:schemeClr val="accent1"/>
+          </a:effectRef>
+          <a:fontRef idx="minor">
+            <a:schemeClr val="lt1"/>
+          </a:fontRef>
+        </p:style>
+        <p:txBody>
+          <a:bodyPr rtlCol="0" anchor="ctr"/>
+          <a:lstStyle/>
+          <a:p>
+            <a:pPr algn="ctr"/>
+            <a:endParaRPr lang="en-US"/>
+          </a:p>
+        </p:txBody>
+      </p:sp>
+      <p:cxnSp>
+        <p:nvCxnSpPr>
+          <p:cNvPr id="15" name="Straight Arrow Connector 14">
+            <a:extLst>
+              <a:ext uri="{FF2B5EF4-FFF2-40B4-BE49-F238E27FC236}">
+                <a16:creationId xmlns:a16="http://schemas.microsoft.com/office/drawing/2014/main" id="{BCC0A0F2-27A1-314B-1B57-8AB71FF1B983}"/>
+              </a:ext>
+            </a:extLst>
+          </p:cNvPr>
+          <p:cNvCxnSpPr/>
+          <p:nvPr/>
+        </p:nvCxnSpPr>
+        <p:spPr>
+          <a:xfrm flipH="1">
+            <a:off x="9064139" y="6048375"/>
+            <a:ext cx="394186" cy="133350"/>
+          </a:xfrm>
+          <a:prstGeom prst="straightConnector1">
+            <a:avLst/>
+          </a:prstGeom>
+          <a:ln>
+            <a:tailEnd type="triangle"/>
+          </a:ln>
+        </p:spPr>
+        <p:style>
+          <a:lnRef idx="2">
+            <a:schemeClr val="accent1"/>
+          </a:lnRef>
+          <a:fillRef idx="0">
+            <a:schemeClr val="accent1"/>
+          </a:fillRef>
+          <a:effectRef idx="1">
+            <a:schemeClr val="accent1"/>
+          </a:effectRef>
+          <a:fontRef idx="minor">
+            <a:schemeClr val="tx1"/>
+          </a:fontRef>
+        </p:style>
+      </p:cxnSp>
+      <p:sp>
+        <p:nvSpPr>
+          <p:cNvPr id="16" name="TextBox 15">
+            <a:extLst>
+              <a:ext uri="{FF2B5EF4-FFF2-40B4-BE49-F238E27FC236}">
+                <a16:creationId xmlns:a16="http://schemas.microsoft.com/office/drawing/2014/main" id="{0F3D9029-E2DB-DD27-98C7-DFF8498CE9E8}"/>
+              </a:ext>
+            </a:extLst>
+          </p:cNvPr>
+          <p:cNvSpPr txBox="1"/>
+          <p:nvPr/>
+        </p:nvSpPr>
+        <p:spPr>
+          <a:xfrm>
+            <a:off x="9686925" y="5486400"/>
+            <a:ext cx="495300" cy="369332"/>
+          </a:xfrm>
+          <a:prstGeom prst="rect">
+            <a:avLst/>
+          </a:prstGeom>
+          <a:noFill/>
+        </p:spPr>
+        <p:txBody>
+          <a:bodyPr wrap="square" rtlCol="0">
+            <a:spAutoFit/>
+          </a:bodyPr>
+          <a:lstStyle/>
+          <a:p>
+            <a:r>
+              <a:rPr lang="en-US" dirty="0"/>
+              <a:t>?</a:t>
+            </a:r>
+          </a:p>
+        </p:txBody>
+      </p:sp>
+      <p:sp>
+        <p:nvSpPr>
+          <p:cNvPr id="18" name="Rectangle 17">
+            <a:extLst>
+              <a:ext uri="{FF2B5EF4-FFF2-40B4-BE49-F238E27FC236}">
+                <a16:creationId xmlns:a16="http://schemas.microsoft.com/office/drawing/2014/main" id="{46EFA72A-85E2-4214-30EA-82994B0D1663}"/>
+              </a:ext>
+            </a:extLst>
+          </p:cNvPr>
+          <p:cNvSpPr/>
+          <p:nvPr/>
+        </p:nvSpPr>
+        <p:spPr>
+          <a:xfrm>
+            <a:off x="4599265" y="2343150"/>
+            <a:ext cx="1496735" cy="1731893"/>
+          </a:xfrm>
+          <a:prstGeom prst="rect">
+            <a:avLst/>
+          </a:prstGeom>
+          <a:noFill/>
+          <a:ln w="38100">
+            <a:solidFill>
+              <a:schemeClr val="accent6">
+                <a:lumMod val="50000"/>
+              </a:schemeClr>
+            </a:solidFill>
+          </a:ln>
+        </p:spPr>
+        <p:style>
+          <a:lnRef idx="2">
+            <a:schemeClr val="accent1">
+              <a:shade val="15000"/>
+            </a:schemeClr>
+          </a:lnRef>
+          <a:fillRef idx="1">
+            <a:schemeClr val="accent1"/>
+          </a:fillRef>
+          <a:effectRef idx="0">
+            <a:schemeClr val="accent1"/>
+          </a:effectRef>
+          <a:fontRef idx="minor">
+            <a:schemeClr val="lt1"/>
+          </a:fontRef>
+        </p:style>
+        <p:txBody>
+          <a:bodyPr rtlCol="0" anchor="ctr"/>
+          <a:lstStyle/>
+          <a:p>
+            <a:pPr algn="ctr"/>
+            <a:endParaRPr lang="en-US"/>
+          </a:p>
+        </p:txBody>
+      </p:sp>
+      <p:cxnSp>
+        <p:nvCxnSpPr>
+          <p:cNvPr id="19" name="Straight Arrow Connector 18">
+            <a:extLst>
+              <a:ext uri="{FF2B5EF4-FFF2-40B4-BE49-F238E27FC236}">
+                <a16:creationId xmlns:a16="http://schemas.microsoft.com/office/drawing/2014/main" id="{F6789AC7-79FF-12E1-3C7E-BE157CF1544D}"/>
+              </a:ext>
+            </a:extLst>
+          </p:cNvPr>
+          <p:cNvCxnSpPr>
+            <a:cxnSpLocks/>
+          </p:cNvCxnSpPr>
+          <p:nvPr/>
+        </p:nvCxnSpPr>
+        <p:spPr>
+          <a:xfrm>
+            <a:off x="4125258" y="3075390"/>
+            <a:ext cx="463753" cy="133706"/>
+          </a:xfrm>
+          <a:prstGeom prst="straightConnector1">
+            <a:avLst/>
+          </a:prstGeom>
+          <a:ln>
+            <a:tailEnd type="triangle"/>
+          </a:ln>
+        </p:spPr>
+        <p:style>
+          <a:lnRef idx="2">
+            <a:schemeClr val="accent1"/>
+          </a:lnRef>
+          <a:fillRef idx="0">
+            <a:schemeClr val="accent1"/>
+          </a:fillRef>
+          <a:effectRef idx="1">
+            <a:schemeClr val="accent1"/>
+          </a:effectRef>
+          <a:fontRef idx="minor">
+            <a:schemeClr val="tx1"/>
+          </a:fontRef>
+        </p:style>
+      </p:cxnSp>
+      <p:sp>
+        <p:nvSpPr>
+          <p:cNvPr id="22" name="TextBox 21">
+            <a:extLst>
+              <a:ext uri="{FF2B5EF4-FFF2-40B4-BE49-F238E27FC236}">
+                <a16:creationId xmlns:a16="http://schemas.microsoft.com/office/drawing/2014/main" id="{9C90741E-478B-C7DA-532A-FC4D63FD5C56}"/>
+              </a:ext>
+            </a:extLst>
+          </p:cNvPr>
+          <p:cNvSpPr txBox="1"/>
+          <p:nvPr/>
+        </p:nvSpPr>
+        <p:spPr>
+          <a:xfrm>
+            <a:off x="2348481" y="2875794"/>
+            <a:ext cx="1856598" cy="646331"/>
+          </a:xfrm>
+          <a:prstGeom prst="rect">
+            <a:avLst/>
+          </a:prstGeom>
+          <a:noFill/>
+        </p:spPr>
+        <p:txBody>
+          <a:bodyPr wrap="square" rtlCol="0">
+            <a:spAutoFit/>
+          </a:bodyPr>
+          <a:lstStyle/>
+          <a:p>
+            <a:r>
+              <a:rPr lang="en-US" dirty="0"/>
+              <a:t>15-min coupling interval</a:t>
+            </a:r>
+          </a:p>
+        </p:txBody>
+      </p:sp>
+    </p:spTree>
+    <p:extLst>
+      <p:ext uri="{BB962C8B-B14F-4D97-AF65-F5344CB8AC3E}">
+        <p14:creationId xmlns:p14="http://schemas.microsoft.com/office/powerpoint/2010/main" val="2111082732"/>
+      </p:ext>
+    </p:extLst>
+  </p:cSld>
+  <p:clrMapOvr>
+    <a:masterClrMapping/>
+  </p:clrMapOvr>
+</p:sld>
+</file>
+
+<file path=ppt/slides/slide8.xml><?xml version="1.0" encoding="utf-8"?>
+<p:sld xmlns:a="http://schemas.openxmlformats.org/drawingml/2006/main" xmlns:r="http://schemas.openxmlformats.org/officeDocument/2006/relationships" xmlns:p="http://schemas.openxmlformats.org/presentationml/2006/main">
+  <p:cSld>
+    <p:spTree>
+      <p:nvGrpSpPr>
+        <p:cNvPr id="1" name=""/>
+        <p:cNvGrpSpPr/>
+        <p:nvPr/>
+      </p:nvGrpSpPr>
+      <p:grpSpPr>
+        <a:xfrm>
+          <a:off x="0" y="0"/>
+          <a:ext cx="0" cy="0"/>
+          <a:chOff x="0" y="0"/>
+          <a:chExt cx="0" cy="0"/>
+        </a:xfrm>
+      </p:grpSpPr>
+      <p:sp>
+        <p:nvSpPr>
+          <p:cNvPr id="2" name="Title 1">
+            <a:extLst>
+              <a:ext uri="{FF2B5EF4-FFF2-40B4-BE49-F238E27FC236}">
                 <a16:creationId xmlns:a16="http://schemas.microsoft.com/office/drawing/2014/main" id="{4E57A8EE-164B-141B-6792-7AA780FE367A}"/>
               </a:ext>
             </a:extLst>
@@ -4442,54 +5752,317 @@
             <p:ph type="title"/>
           </p:nvPr>
         </p:nvSpPr>
-        <p:spPr/>
-        <p:txBody>
-          <a:bodyPr/>
-          <a:lstStyle/>
-          <a:p>
+        <p:spPr>
+          <a:xfrm>
+            <a:off x="219075" y="177560"/>
+            <a:ext cx="4631717" cy="740736"/>
+          </a:xfrm>
+        </p:spPr>
+        <p:txBody>
+          <a:bodyPr>
+            <a:noAutofit/>
+          </a:bodyPr>
+          <a:lstStyle/>
+          <a:p>
+            <a:r>
+              <a:rPr lang="en-US" sz="3000" dirty="0"/>
+              <a:t>Mill Creek</a:t>
+            </a:r>
+          </a:p>
+        </p:txBody>
+      </p:sp>
+      <p:sp>
+        <p:nvSpPr>
+          <p:cNvPr id="3" name="Content Placeholder 2">
+            <a:extLst>
+              <a:ext uri="{FF2B5EF4-FFF2-40B4-BE49-F238E27FC236}">
+                <a16:creationId xmlns:a16="http://schemas.microsoft.com/office/drawing/2014/main" id="{3DED9C54-3B8A-1B17-3A53-A4178131FEA1}"/>
+              </a:ext>
+            </a:extLst>
+          </p:cNvPr>
+          <p:cNvSpPr>
+            <a:spLocks noGrp="1"/>
+          </p:cNvSpPr>
+          <p:nvPr>
+            <p:ph idx="1"/>
+          </p:nvPr>
+        </p:nvSpPr>
+        <p:spPr>
+          <a:xfrm>
+            <a:off x="0" y="909663"/>
+            <a:ext cx="4006651" cy="2519338"/>
+          </a:xfrm>
+        </p:spPr>
+        <p:txBody>
+          <a:bodyPr>
+            <a:normAutofit lnSpcReduction="10000"/>
+          </a:bodyPr>
+          <a:lstStyle/>
+          <a:p>
+            <a:r>
+              <a:rPr lang="en-US" sz="2000" dirty="0"/>
+              <a:t>Drain cells are large</a:t>
+            </a:r>
+          </a:p>
+          <a:p>
+            <a:r>
+              <a:rPr lang="en-US" sz="2000" dirty="0"/>
+              <a:t>Does it need to be represented in MF?</a:t>
+            </a:r>
+          </a:p>
+          <a:p>
+            <a:pPr lvl="1"/>
+            <a:r>
+              <a:rPr lang="en-US" sz="2000" dirty="0">
+                <a:highlight>
+                  <a:srgbClr val="FFFF00"/>
+                </a:highlight>
+              </a:rPr>
+              <a:t>Mill creek in SWMM is an open channel</a:t>
+            </a:r>
+          </a:p>
+          <a:p>
+            <a:pPr lvl="1"/>
+            <a:r>
+              <a:rPr lang="en-US" sz="2000" dirty="0"/>
+              <a:t>I send VP location of Mill Creek gage. They will return flow rates and water depth </a:t>
+            </a:r>
+          </a:p>
+          <a:p>
+            <a:pPr lvl="1"/>
+            <a:endParaRPr lang="en-US" dirty="0"/>
+          </a:p>
+        </p:txBody>
+      </p:sp>
+      <p:pic>
+        <p:nvPicPr>
+          <p:cNvPr id="7" name="Picture 6">
+            <a:extLst>
+              <a:ext uri="{FF2B5EF4-FFF2-40B4-BE49-F238E27FC236}">
+                <a16:creationId xmlns:a16="http://schemas.microsoft.com/office/drawing/2014/main" id="{8BB20C7C-D2C6-5E4B-B69D-8359F5FF452A}"/>
+              </a:ext>
+            </a:extLst>
+          </p:cNvPr>
+          <p:cNvPicPr>
+            <a:picLocks noChangeAspect="1"/>
+          </p:cNvPicPr>
+          <p:nvPr/>
+        </p:nvPicPr>
+        <p:blipFill>
+          <a:blip r:embed="rId2"/>
+          <a:stretch>
+            <a:fillRect/>
+          </a:stretch>
+        </p:blipFill>
+        <p:spPr>
+          <a:xfrm>
+            <a:off x="4158374" y="68870"/>
+            <a:ext cx="7723027" cy="5879467"/>
+          </a:xfrm>
+          <a:prstGeom prst="rect">
+            <a:avLst/>
+          </a:prstGeom>
+        </p:spPr>
+      </p:pic>
+      <p:sp>
+        <p:nvSpPr>
+          <p:cNvPr id="10" name="TextBox 9">
+            <a:extLst>
+              <a:ext uri="{FF2B5EF4-FFF2-40B4-BE49-F238E27FC236}">
+                <a16:creationId xmlns:a16="http://schemas.microsoft.com/office/drawing/2014/main" id="{6EF6EA30-3AA9-D04C-F80F-049DB1EEEEBF}"/>
+              </a:ext>
+            </a:extLst>
+          </p:cNvPr>
+          <p:cNvSpPr txBox="1"/>
+          <p:nvPr/>
+        </p:nvSpPr>
+        <p:spPr>
+          <a:xfrm>
+            <a:off x="219075" y="3555495"/>
+            <a:ext cx="4517518" cy="2862322"/>
+          </a:xfrm>
+          <a:prstGeom prst="rect">
+            <a:avLst/>
+          </a:prstGeom>
+          <a:noFill/>
+        </p:spPr>
+        <p:txBody>
+          <a:bodyPr wrap="square" rtlCol="0">
+            <a:spAutoFit/>
+          </a:bodyPr>
+          <a:lstStyle/>
+          <a:p>
+            <a:r>
+              <a:rPr lang="en-US" b="1" dirty="0"/>
+              <a:t>Solid Line(s): </a:t>
+            </a:r>
             <a:r>
               <a:rPr lang="en-US" dirty="0"/>
-              <a:t>Discuss Mill Creek drain</a:t>
-            </a:r>
-          </a:p>
-        </p:txBody>
-      </p:sp>
-      <p:sp>
-        <p:nvSpPr>
-          <p:cNvPr id="3" name="Content Placeholder 2">
-            <a:extLst>
-              <a:ext uri="{FF2B5EF4-FFF2-40B4-BE49-F238E27FC236}">
-                <a16:creationId xmlns:a16="http://schemas.microsoft.com/office/drawing/2014/main" id="{3DED9C54-3B8A-1B17-3A53-A4178131FEA1}"/>
-              </a:ext>
-            </a:extLst>
-          </p:cNvPr>
-          <p:cNvSpPr>
-            <a:spLocks noGrp="1"/>
-          </p:cNvSpPr>
-          <p:nvPr>
-            <p:ph idx="1"/>
-          </p:nvPr>
-        </p:nvSpPr>
-        <p:spPr/>
-        <p:txBody>
-          <a:bodyPr/>
-          <a:lstStyle/>
-          <a:p>
+              <a:t>Coupled models with and without </a:t>
+            </a:r>
+            <a:r>
+              <a:rPr lang="en-US" dirty="0" err="1"/>
+              <a:t>swmm</a:t>
+            </a:r>
+            <a:endParaRPr lang="en-US" dirty="0"/>
+          </a:p>
+          <a:p>
+            <a:r>
+              <a:rPr lang="en-US" b="1" dirty="0"/>
+              <a:t>Dotted lines: </a:t>
+            </a:r>
+            <a:r>
+              <a:rPr lang="en-US" dirty="0" err="1"/>
+              <a:t>Modflow</a:t>
+            </a:r>
             <a:r>
               <a:rPr lang="en-US" dirty="0"/>
-              <a:t>Cells are large</a:t>
-            </a:r>
-          </a:p>
-          <a:p>
+              <a:t> Only</a:t>
+            </a:r>
+          </a:p>
+          <a:p>
+            <a:endParaRPr lang="en-US" dirty="0"/>
+          </a:p>
+          <a:p>
+            <a:pPr marL="285750" indent="-285750">
+              <a:buFont typeface="Arial" panose="020B0604020202020204" pitchFamily="34" charset="0"/>
+              <a:buChar char="•"/>
+            </a:pPr>
             <a:r>
               <a:rPr lang="en-US" dirty="0"/>
-              <a:t>Heads are wacky</a:t>
-            </a:r>
-          </a:p>
-          <a:p>
+              <a:t>Only the lower reach of Mill Creek is affected by coupling with tides.</a:t>
+            </a:r>
+          </a:p>
+          <a:p>
+            <a:pPr marL="285750" indent="-285750">
+              <a:buFont typeface="Arial" panose="020B0604020202020204" pitchFamily="34" charset="0"/>
+              <a:buChar char="•"/>
+            </a:pPr>
             <a:r>
               <a:rPr lang="en-US" dirty="0"/>
-              <a:t>Does it need to be represented in MF?</a:t>
+              <a:t>Coupling with tides results in shorter lag time. </a:t>
+            </a:r>
+          </a:p>
+          <a:p>
+            <a:pPr marL="285750" indent="-285750">
+              <a:buFont typeface="Arial" panose="020B0604020202020204" pitchFamily="34" charset="0"/>
+              <a:buChar char="•"/>
+            </a:pPr>
+            <a:r>
+              <a:rPr lang="en-US" dirty="0"/>
+              <a:t>SWMM coupling does not impact drain discharge in a significant way</a:t>
+            </a:r>
+          </a:p>
+        </p:txBody>
+      </p:sp>
+      <p:sp>
+        <p:nvSpPr>
+          <p:cNvPr id="4" name="TextBox 3">
+            <a:extLst>
+              <a:ext uri="{FF2B5EF4-FFF2-40B4-BE49-F238E27FC236}">
+                <a16:creationId xmlns:a16="http://schemas.microsoft.com/office/drawing/2014/main" id="{C634770E-80D3-6392-1B39-C0BD835D174F}"/>
+              </a:ext>
+            </a:extLst>
+          </p:cNvPr>
+          <p:cNvSpPr txBox="1"/>
+          <p:nvPr/>
+        </p:nvSpPr>
+        <p:spPr>
+          <a:xfrm>
+            <a:off x="8869680" y="4864608"/>
+            <a:ext cx="2487168" cy="2031325"/>
+          </a:xfrm>
+          <a:prstGeom prst="rect">
+            <a:avLst/>
+          </a:prstGeom>
+          <a:noFill/>
+        </p:spPr>
+        <p:txBody>
+          <a:bodyPr wrap="square" rtlCol="0">
+            <a:spAutoFit/>
+          </a:bodyPr>
+          <a:lstStyle/>
+          <a:p>
+            <a:pPr marL="285750" indent="-285750">
+              <a:buFont typeface="Arial" panose="020B0604020202020204" pitchFamily="34" charset="0"/>
+              <a:buChar char="•"/>
+            </a:pPr>
+            <a:r>
+              <a:rPr lang="en-US" dirty="0">
+                <a:highlight>
+                  <a:srgbClr val="00FF00"/>
+                </a:highlight>
+              </a:rPr>
+              <a:t>Plot the fluxes of </a:t>
+            </a:r>
+            <a:r>
+              <a:rPr lang="en-US" dirty="0" err="1">
+                <a:highlight>
+                  <a:srgbClr val="00FF00"/>
+                </a:highlight>
+              </a:rPr>
+              <a:t>swmm</a:t>
+            </a:r>
+            <a:r>
+              <a:rPr lang="en-US" dirty="0">
+                <a:highlight>
+                  <a:srgbClr val="00FF00"/>
+                </a:highlight>
+              </a:rPr>
+              <a:t> wells that represent mill creek</a:t>
+            </a:r>
+          </a:p>
+          <a:p>
+            <a:pPr marL="285750" indent="-285750">
+              <a:buFont typeface="Arial" panose="020B0604020202020204" pitchFamily="34" charset="0"/>
+              <a:buChar char="•"/>
+            </a:pPr>
+            <a:r>
+              <a:rPr lang="en-US" dirty="0">
+                <a:highlight>
+                  <a:srgbClr val="00FF00"/>
+                </a:highlight>
+              </a:rPr>
+              <a:t>Check if we have cells that are defined as both wells and drains </a:t>
+            </a:r>
+          </a:p>
+        </p:txBody>
+      </p:sp>
+      <p:sp>
+        <p:nvSpPr>
+          <p:cNvPr id="5" name="TextBox 4">
+            <a:extLst>
+              <a:ext uri="{FF2B5EF4-FFF2-40B4-BE49-F238E27FC236}">
+                <a16:creationId xmlns:a16="http://schemas.microsoft.com/office/drawing/2014/main" id="{E4767637-0B12-0641-90BF-50FA96A49FE5}"/>
+              </a:ext>
+            </a:extLst>
+          </p:cNvPr>
+          <p:cNvSpPr txBox="1"/>
+          <p:nvPr/>
+        </p:nvSpPr>
+        <p:spPr>
+          <a:xfrm>
+            <a:off x="5447115" y="5865800"/>
+            <a:ext cx="3346704" cy="923330"/>
+          </a:xfrm>
+          <a:prstGeom prst="rect">
+            <a:avLst/>
+          </a:prstGeom>
+          <a:noFill/>
+        </p:spPr>
+        <p:txBody>
+          <a:bodyPr wrap="square" rtlCol="0">
+            <a:spAutoFit/>
+          </a:bodyPr>
+          <a:lstStyle/>
+          <a:p>
+            <a:r>
+              <a:rPr lang="en-US" dirty="0">
+                <a:highlight>
+                  <a:srgbClr val="00FF00"/>
+                </a:highlight>
+              </a:rPr>
+              <a:t>* How can we provide DRN discharge to SWMM for routing, without double counting?</a:t>
             </a:r>
           </a:p>
         </p:txBody>
@@ -4498,6 +6071,107 @@
     <p:extLst>
       <p:ext uri="{BB962C8B-B14F-4D97-AF65-F5344CB8AC3E}">
         <p14:creationId xmlns:p14="http://schemas.microsoft.com/office/powerpoint/2010/main" val="4118319199"/>
+      </p:ext>
+    </p:extLst>
+  </p:cSld>
+  <p:clrMapOvr>
+    <a:masterClrMapping/>
+  </p:clrMapOvr>
+</p:sld>
+</file>
+
+<file path=ppt/slides/slide9.xml><?xml version="1.0" encoding="utf-8"?>
+<p:sld xmlns:a="http://schemas.openxmlformats.org/drawingml/2006/main" xmlns:r="http://schemas.openxmlformats.org/officeDocument/2006/relationships" xmlns:p="http://schemas.openxmlformats.org/presentationml/2006/main">
+  <p:cSld>
+    <p:spTree>
+      <p:nvGrpSpPr>
+        <p:cNvPr id="1" name=""/>
+        <p:cNvGrpSpPr/>
+        <p:nvPr/>
+      </p:nvGrpSpPr>
+      <p:grpSpPr>
+        <a:xfrm>
+          <a:off x="0" y="0"/>
+          <a:ext cx="0" cy="0"/>
+          <a:chOff x="0" y="0"/>
+          <a:chExt cx="0" cy="0"/>
+        </a:xfrm>
+      </p:grpSpPr>
+      <p:sp>
+        <p:nvSpPr>
+          <p:cNvPr id="2" name="Title 1">
+            <a:extLst>
+              <a:ext uri="{FF2B5EF4-FFF2-40B4-BE49-F238E27FC236}">
+                <a16:creationId xmlns:a16="http://schemas.microsoft.com/office/drawing/2014/main" id="{5C227658-2158-B03B-6E60-A0CF06A87612}"/>
+              </a:ext>
+            </a:extLst>
+          </p:cNvPr>
+          <p:cNvSpPr>
+            <a:spLocks noGrp="1"/>
+          </p:cNvSpPr>
+          <p:nvPr>
+            <p:ph type="title"/>
+          </p:nvPr>
+        </p:nvSpPr>
+        <p:spPr/>
+        <p:txBody>
+          <a:bodyPr/>
+          <a:lstStyle/>
+          <a:p>
+            <a:endParaRPr lang="en-US"/>
+          </a:p>
+        </p:txBody>
+      </p:sp>
+      <p:sp>
+        <p:nvSpPr>
+          <p:cNvPr id="4" name="Rectangle 3">
+            <a:extLst>
+              <a:ext uri="{FF2B5EF4-FFF2-40B4-BE49-F238E27FC236}">
+                <a16:creationId xmlns:a16="http://schemas.microsoft.com/office/drawing/2014/main" id="{8958B95A-12F2-39CA-E532-06A6425917BA}"/>
+              </a:ext>
+            </a:extLst>
+          </p:cNvPr>
+          <p:cNvSpPr/>
+          <p:nvPr/>
+        </p:nvSpPr>
+        <p:spPr>
+          <a:xfrm>
+            <a:off x="2029968" y="3044952"/>
+            <a:ext cx="1709928" cy="1481328"/>
+          </a:xfrm>
+          <a:prstGeom prst="rect">
+            <a:avLst/>
+          </a:prstGeom>
+        </p:spPr>
+        <p:style>
+          <a:lnRef idx="2">
+            <a:schemeClr val="accent1">
+              <a:shade val="15000"/>
+            </a:schemeClr>
+          </a:lnRef>
+          <a:fillRef idx="1">
+            <a:schemeClr val="accent1"/>
+          </a:fillRef>
+          <a:effectRef idx="0">
+            <a:schemeClr val="accent1"/>
+          </a:effectRef>
+          <a:fontRef idx="minor">
+            <a:schemeClr val="lt1"/>
+          </a:fontRef>
+        </p:style>
+        <p:txBody>
+          <a:bodyPr rtlCol="0" anchor="ctr"/>
+          <a:lstStyle/>
+          <a:p>
+            <a:pPr algn="ctr"/>
+            <a:endParaRPr lang="en-US"/>
+          </a:p>
+        </p:txBody>
+      </p:sp>
+    </p:spTree>
+    <p:extLst>
+      <p:ext uri="{BB962C8B-B14F-4D97-AF65-F5344CB8AC3E}">
+        <p14:creationId xmlns:p14="http://schemas.microsoft.com/office/powerpoint/2010/main" val="1836506533"/>
       </p:ext>
     </p:extLst>
   </p:cSld>

</xml_diff>